<commit_message>
docs: embed workflow diagram image in pptx
</commit_message>
<xml_diff>
--- a/CircleUp_Presentation.pptx
+++ b/CircleUp_Presentation.pptx
@@ -3247,191 +3247,30 @@
           </a:p>
         </p:txBody>
       </p:sp>
-      <p:sp>
-        <p:nvSpPr>
-          <p:cNvPr id="3" name="Text 1"/>
-          <p:cNvSpPr/>
+      <p:pic>
+        <p:nvPicPr>
+          <p:cNvPr id="3" name="Image 0" descr="workflow_chart.png">    </p:cNvPr>
+          <p:cNvPicPr>
+            <a:picLocks noChangeAspect="1"/>
+          </p:cNvPicPr>
           <p:nvPr/>
-        </p:nvSpPr>
+        </p:nvPicPr>
+        <p:blipFill>
+          <a:blip r:embed="rId1"/>
+          <a:stretch>
+            <a:fillRect/>
+          </a:stretch>
+        </p:blipFill>
         <p:spPr>
           <a:xfrm>
             <a:off x="457200" y="1371600"/>
-            <a:ext cx="8229600" cy="457200"/>
-          </a:xfrm>
-          <a:prstGeom prst="rect">
-            <a:avLst/>
-          </a:prstGeom>
-          <a:noFill/>
-          <a:ln/>
-        </p:spPr>
-        <p:txBody>
-          <a:bodyPr wrap="square" rtlCol="0" anchor="ctr"/>
-          <a:lstStyle/>
-          <a:p>
-            <a:pPr marL="342900" indent="-342900">
-              <a:buSzPct val="100000"/>
-              <a:buChar char="•"/>
-            </a:pPr>
-            <a:r>
-              <a:rPr lang="en-US" sz="1800" dirty="0">
-                <a:solidFill>
-                  <a:srgbClr val="F9FAFB"/>
-                </a:solidFill>
-              </a:rPr>
-              <a:t>1. Main Branch (Production)</a:t>
-            </a:r>
-            <a:endParaRPr lang="en-US" sz="1800" dirty="0"/>
-          </a:p>
-        </p:txBody>
-      </p:sp>
-      <p:sp>
-        <p:nvSpPr>
-          <p:cNvPr id="4" name="Text 2"/>
-          <p:cNvSpPr/>
-          <p:nvPr/>
-        </p:nvSpPr>
-        <p:spPr>
-          <a:xfrm>
-            <a:off x="457200" y="1920240"/>
-            <a:ext cx="8229600" cy="457200"/>
-          </a:xfrm>
-          <a:prstGeom prst="rect">
-            <a:avLst/>
-          </a:prstGeom>
-          <a:noFill/>
-          <a:ln/>
-        </p:spPr>
-        <p:txBody>
-          <a:bodyPr wrap="square" rtlCol="0" anchor="ctr"/>
-          <a:lstStyle/>
-          <a:p>
-            <a:pPr marL="342900" indent="-342900">
-              <a:buSzPct val="100000"/>
-              <a:buChar char="•"/>
-            </a:pPr>
-            <a:r>
-              <a:rPr lang="en-US" sz="1800" dirty="0">
-                <a:solidFill>
-                  <a:srgbClr val="F9FAFB"/>
-                </a:solidFill>
-              </a:rPr>
-              <a:t>2. Feature Branch: feature-dark-mode (Rebased on Main)</a:t>
-            </a:r>
-            <a:endParaRPr lang="en-US" sz="1800" dirty="0"/>
-          </a:p>
-        </p:txBody>
-      </p:sp>
-      <p:sp>
-        <p:nvSpPr>
-          <p:cNvPr id="5" name="Text 3"/>
-          <p:cNvSpPr/>
-          <p:nvPr/>
-        </p:nvSpPr>
-        <p:spPr>
-          <a:xfrm>
-            <a:off x="457200" y="2468880"/>
-            <a:ext cx="8229600" cy="457200"/>
-          </a:xfrm>
-          <a:prstGeom prst="rect">
-            <a:avLst/>
-          </a:prstGeom>
-          <a:noFill/>
-          <a:ln/>
-        </p:spPr>
-        <p:txBody>
-          <a:bodyPr wrap="square" rtlCol="0" anchor="ctr"/>
-          <a:lstStyle/>
-          <a:p>
-            <a:pPr marL="342900" indent="-342900">
-              <a:buSzPct val="100000"/>
-              <a:buChar char="•"/>
-            </a:pPr>
-            <a:r>
-              <a:rPr lang="en-US" sz="1800" dirty="0">
-                <a:solidFill>
-                  <a:srgbClr val="F9FAFB"/>
-                </a:solidFill>
-              </a:rPr>
-              <a:t>3. Feature Branch: feature-music (Merged)</a:t>
-            </a:r>
-            <a:endParaRPr lang="en-US" sz="1800" dirty="0"/>
-          </a:p>
-        </p:txBody>
-      </p:sp>
-      <p:sp>
-        <p:nvSpPr>
-          <p:cNvPr id="6" name="Text 4"/>
-          <p:cNvSpPr/>
-          <p:nvPr/>
-        </p:nvSpPr>
-        <p:spPr>
-          <a:xfrm>
-            <a:off x="457200" y="3017520"/>
-            <a:ext cx="8229600" cy="457200"/>
-          </a:xfrm>
-          <a:prstGeom prst="rect">
-            <a:avLst/>
-          </a:prstGeom>
-          <a:noFill/>
-          <a:ln/>
-        </p:spPr>
-        <p:txBody>
-          <a:bodyPr wrap="square" rtlCol="0" anchor="ctr"/>
-          <a:lstStyle/>
-          <a:p>
-            <a:pPr marL="342900" indent="-342900">
-              <a:buSzPct val="100000"/>
-              <a:buChar char="•"/>
-            </a:pPr>
-            <a:r>
-              <a:rPr lang="en-US" sz="1800" dirty="0">
-                <a:solidFill>
-                  <a:srgbClr val="F9FAFB"/>
-                </a:solidFill>
-              </a:rPr>
-              <a:t>4. Release Branch: v1.5 (Bug fixes, Merged)</a:t>
-            </a:r>
-            <a:endParaRPr lang="en-US" sz="1800" dirty="0"/>
-          </a:p>
-        </p:txBody>
-      </p:sp>
-      <p:sp>
-        <p:nvSpPr>
-          <p:cNvPr id="7" name="Text 5"/>
-          <p:cNvSpPr/>
-          <p:nvPr/>
-        </p:nvSpPr>
-        <p:spPr>
-          <a:xfrm>
-            <a:off x="457200" y="3566160"/>
-            <a:ext cx="8229600" cy="457200"/>
-          </a:xfrm>
-          <a:prstGeom prst="rect">
-            <a:avLst/>
-          </a:prstGeom>
-          <a:noFill/>
-          <a:ln/>
-        </p:spPr>
-        <p:txBody>
-          <a:bodyPr wrap="square" rtlCol="0" anchor="ctr"/>
-          <a:lstStyle/>
-          <a:p>
-            <a:pPr marL="342900" indent="-342900">
-              <a:buSzPct val="100000"/>
-              <a:buChar char="•"/>
-            </a:pPr>
-            <a:r>
-              <a:rPr lang="en-US" sz="1800" dirty="0">
-                <a:solidFill>
-                  <a:srgbClr val="F9FAFB"/>
-                </a:solidFill>
-              </a:rPr>
-              <a:t>Tags: v1.0, v1.1, v1.5 marked stable releases.</a:t>
-            </a:r>
-            <a:endParaRPr lang="en-US" sz="1800" dirty="0"/>
-          </a:p>
-        </p:txBody>
-      </p:sp>
+            <a:ext cx="8229600" cy="3200400"/>
+          </a:xfrm>
+          <a:prstGeom prst="rect">
+            <a:avLst/>
+          </a:prstGeom>
+        </p:spPr>
+      </p:pic>
     </p:spTree>
   </p:cSld>
   <p:clrMapOvr>

</xml_diff>

<commit_message>
docs: rename branches and expand Git/GitHub section in presentation
</commit_message>
<xml_diff>
--- a/CircleUp_Presentation.pptx
+++ b/CircleUp_Presentation.pptx
@@ -15,9 +15,12 @@
     <p:sldId id="263" r:id="rId9"/>
     <p:sldId id="264" r:id="rId10"/>
     <p:sldId id="265" r:id="rId11"/>
+    <p:sldId id="266" r:id="rId12"/>
+    <p:sldId id="267" r:id="rId13"/>
+    <p:sldId id="268" r:id="rId14"/>
   </p:sldIdLst>
   <p:notesMasterIdLst>
-    <p:notesMasterId r:id="rId12"/>
+    <p:notesMasterId r:id="rId15"/>
   </p:notesMasterIdLst>
   <p:sldSz cx="9144000" cy="5143500"/>
   <p:notesSz cx="5143500" cy="9144000"/>
@@ -623,6 +626,270 @@
             <a:fld id="{F7021451-1387-4CA6-816F-3879F97B5CBC}" type="slidenum">
               <a:rPr lang="en-US"/>
               <a:t>10</a:t>
+            </a:fld>
+            <a:endParaRPr lang="en-US"/>
+          </a:p>
+        </p:txBody>
+      </p:sp>
+    </p:spTree>
+    <p:extLst>
+      <p:ext uri="{BB962C8B-B14F-4D97-AF65-F5344CB8AC3E}">
+        <p14:creationId xmlns:p14="http://schemas.microsoft.com/office/powerpoint/2010/main" val="1024086991"/>
+      </p:ext>
+    </p:extLst>
+  </p:cSld>
+  <p:clrMapOvr>
+    <a:masterClrMapping/>
+  </p:clrMapOvr>
+</p:notes>
+</file>
+
+<file path=ppt/notesSlides/notesSlide11.xml><?xml version="1.0" encoding="utf-8"?>
+<p:notes xmlns:a="http://schemas.openxmlformats.org/drawingml/2006/main" xmlns:r="http://schemas.openxmlformats.org/officeDocument/2006/relationships" xmlns:p="http://schemas.openxmlformats.org/presentationml/2006/main">
+  <p:cSld>
+    <p:spTree>
+      <p:nvGrpSpPr>
+        <p:cNvPr id="1" name=""/>
+        <p:cNvGrpSpPr/>
+        <p:nvPr/>
+      </p:nvGrpSpPr>
+      <p:grpSpPr>
+        <a:xfrm>
+          <a:off x="0" y="0"/>
+          <a:ext cx="0" cy="0"/>
+          <a:chOff x="0" y="0"/>
+          <a:chExt cx="0" cy="0"/>
+        </a:xfrm>
+      </p:grpSpPr>
+      <p:sp>
+        <p:nvSpPr>
+          <p:cNvPr id="2" name="Slide Image Placeholder 1"/>
+          <p:cNvSpPr>
+            <a:spLocks noGrp="1" noRot="1" noChangeAspect="1"/>
+          </p:cNvSpPr>
+          <p:nvPr>
+            <p:ph type="sldImg"/>
+          </p:nvPr>
+        </p:nvSpPr>
+        <p:spPr/>
+      </p:sp>
+      <p:sp>
+        <p:nvSpPr>
+          <p:cNvPr id="3" name="Notes Placeholder 2"/>
+          <p:cNvSpPr>
+            <a:spLocks noGrp="1"/>
+          </p:cNvSpPr>
+          <p:nvPr>
+            <p:ph type="body" idx="1"/>
+          </p:nvPr>
+        </p:nvSpPr>
+        <p:spPr/>
+        <p:txBody>
+          <a:bodyPr/>
+          <a:lstStyle/>
+          <a:p>
+            <a:r>
+              <a:rPr lang="en-US" dirty="0"/>
+              <a:t/>
+            </a:r>
+            <a:endParaRPr lang="en-US" dirty="0"/>
+          </a:p>
+        </p:txBody>
+      </p:sp>
+      <p:sp>
+        <p:nvSpPr>
+          <p:cNvPr id="4" name="Slide Number Placeholder 3"/>
+          <p:cNvSpPr>
+            <a:spLocks noGrp="1"/>
+          </p:cNvSpPr>
+          <p:nvPr>
+            <p:ph type="sldNum" sz="quarter" idx="10"/>
+          </p:nvPr>
+        </p:nvSpPr>
+        <p:spPr/>
+        <p:txBody>
+          <a:bodyPr/>
+          <a:lstStyle/>
+          <a:p>
+            <a:fld id="{F7021451-1387-4CA6-816F-3879F97B5CBC}" type="slidenum">
+              <a:rPr lang="en-US"/>
+              <a:t>11</a:t>
+            </a:fld>
+            <a:endParaRPr lang="en-US"/>
+          </a:p>
+        </p:txBody>
+      </p:sp>
+    </p:spTree>
+    <p:extLst>
+      <p:ext uri="{BB962C8B-B14F-4D97-AF65-F5344CB8AC3E}">
+        <p14:creationId xmlns:p14="http://schemas.microsoft.com/office/powerpoint/2010/main" val="1024086991"/>
+      </p:ext>
+    </p:extLst>
+  </p:cSld>
+  <p:clrMapOvr>
+    <a:masterClrMapping/>
+  </p:clrMapOvr>
+</p:notes>
+</file>
+
+<file path=ppt/notesSlides/notesSlide12.xml><?xml version="1.0" encoding="utf-8"?>
+<p:notes xmlns:a="http://schemas.openxmlformats.org/drawingml/2006/main" xmlns:r="http://schemas.openxmlformats.org/officeDocument/2006/relationships" xmlns:p="http://schemas.openxmlformats.org/presentationml/2006/main">
+  <p:cSld>
+    <p:spTree>
+      <p:nvGrpSpPr>
+        <p:cNvPr id="1" name=""/>
+        <p:cNvGrpSpPr/>
+        <p:nvPr/>
+      </p:nvGrpSpPr>
+      <p:grpSpPr>
+        <a:xfrm>
+          <a:off x="0" y="0"/>
+          <a:ext cx="0" cy="0"/>
+          <a:chOff x="0" y="0"/>
+          <a:chExt cx="0" cy="0"/>
+        </a:xfrm>
+      </p:grpSpPr>
+      <p:sp>
+        <p:nvSpPr>
+          <p:cNvPr id="2" name="Slide Image Placeholder 1"/>
+          <p:cNvSpPr>
+            <a:spLocks noGrp="1" noRot="1" noChangeAspect="1"/>
+          </p:cNvSpPr>
+          <p:nvPr>
+            <p:ph type="sldImg"/>
+          </p:nvPr>
+        </p:nvSpPr>
+        <p:spPr/>
+      </p:sp>
+      <p:sp>
+        <p:nvSpPr>
+          <p:cNvPr id="3" name="Notes Placeholder 2"/>
+          <p:cNvSpPr>
+            <a:spLocks noGrp="1"/>
+          </p:cNvSpPr>
+          <p:nvPr>
+            <p:ph type="body" idx="1"/>
+          </p:nvPr>
+        </p:nvSpPr>
+        <p:spPr/>
+        <p:txBody>
+          <a:bodyPr/>
+          <a:lstStyle/>
+          <a:p>
+            <a:r>
+              <a:rPr lang="en-US" dirty="0"/>
+              <a:t/>
+            </a:r>
+            <a:endParaRPr lang="en-US" dirty="0"/>
+          </a:p>
+        </p:txBody>
+      </p:sp>
+      <p:sp>
+        <p:nvSpPr>
+          <p:cNvPr id="4" name="Slide Number Placeholder 3"/>
+          <p:cNvSpPr>
+            <a:spLocks noGrp="1"/>
+          </p:cNvSpPr>
+          <p:nvPr>
+            <p:ph type="sldNum" sz="quarter" idx="10"/>
+          </p:nvPr>
+        </p:nvSpPr>
+        <p:spPr/>
+        <p:txBody>
+          <a:bodyPr/>
+          <a:lstStyle/>
+          <a:p>
+            <a:fld id="{F7021451-1387-4CA6-816F-3879F97B5CBC}" type="slidenum">
+              <a:rPr lang="en-US"/>
+              <a:t>12</a:t>
+            </a:fld>
+            <a:endParaRPr lang="en-US"/>
+          </a:p>
+        </p:txBody>
+      </p:sp>
+    </p:spTree>
+    <p:extLst>
+      <p:ext uri="{BB962C8B-B14F-4D97-AF65-F5344CB8AC3E}">
+        <p14:creationId xmlns:p14="http://schemas.microsoft.com/office/powerpoint/2010/main" val="1024086991"/>
+      </p:ext>
+    </p:extLst>
+  </p:cSld>
+  <p:clrMapOvr>
+    <a:masterClrMapping/>
+  </p:clrMapOvr>
+</p:notes>
+</file>
+
+<file path=ppt/notesSlides/notesSlide13.xml><?xml version="1.0" encoding="utf-8"?>
+<p:notes xmlns:a="http://schemas.openxmlformats.org/drawingml/2006/main" xmlns:r="http://schemas.openxmlformats.org/officeDocument/2006/relationships" xmlns:p="http://schemas.openxmlformats.org/presentationml/2006/main">
+  <p:cSld>
+    <p:spTree>
+      <p:nvGrpSpPr>
+        <p:cNvPr id="1" name=""/>
+        <p:cNvGrpSpPr/>
+        <p:nvPr/>
+      </p:nvGrpSpPr>
+      <p:grpSpPr>
+        <a:xfrm>
+          <a:off x="0" y="0"/>
+          <a:ext cx="0" cy="0"/>
+          <a:chOff x="0" y="0"/>
+          <a:chExt cx="0" cy="0"/>
+        </a:xfrm>
+      </p:grpSpPr>
+      <p:sp>
+        <p:nvSpPr>
+          <p:cNvPr id="2" name="Slide Image Placeholder 1"/>
+          <p:cNvSpPr>
+            <a:spLocks noGrp="1" noRot="1" noChangeAspect="1"/>
+          </p:cNvSpPr>
+          <p:nvPr>
+            <p:ph type="sldImg"/>
+          </p:nvPr>
+        </p:nvSpPr>
+        <p:spPr/>
+      </p:sp>
+      <p:sp>
+        <p:nvSpPr>
+          <p:cNvPr id="3" name="Notes Placeholder 2"/>
+          <p:cNvSpPr>
+            <a:spLocks noGrp="1"/>
+          </p:cNvSpPr>
+          <p:nvPr>
+            <p:ph type="body" idx="1"/>
+          </p:nvPr>
+        </p:nvSpPr>
+        <p:spPr/>
+        <p:txBody>
+          <a:bodyPr/>
+          <a:lstStyle/>
+          <a:p>
+            <a:r>
+              <a:rPr lang="en-US" dirty="0"/>
+              <a:t/>
+            </a:r>
+            <a:endParaRPr lang="en-US" dirty="0"/>
+          </a:p>
+        </p:txBody>
+      </p:sp>
+      <p:sp>
+        <p:nvSpPr>
+          <p:cNvPr id="4" name="Slide Number Placeholder 3"/>
+          <p:cNvSpPr>
+            <a:spLocks noGrp="1"/>
+          </p:cNvSpPr>
+          <p:nvPr>
+            <p:ph type="sldNum" sz="quarter" idx="10"/>
+          </p:nvPr>
+        </p:nvSpPr>
+        <p:spPr/>
+        <p:txBody>
+          <a:bodyPr/>
+          <a:lstStyle/>
+          <a:p>
+            <a:fld id="{F7021451-1387-4CA6-816F-3879F97B5CBC}" type="slidenum">
+              <a:rPr lang="en-US"/>
+              <a:t>13</a:t>
             </a:fld>
             <a:endParaRPr lang="en-US"/>
           </a:p>
@@ -1810,6 +2077,489 @@
                   <a:srgbClr val="DF6D6D"/>
                 </a:solidFill>
               </a:rPr>
+              <a:t>Git Workflow Visualized</a:t>
+            </a:r>
+            <a:endParaRPr lang="en-US" sz="3200" dirty="0"/>
+          </a:p>
+        </p:txBody>
+      </p:sp>
+      <p:pic>
+        <p:nvPicPr>
+          <p:cNvPr id="3" name="Image 0" descr="workflow_chart.png">    </p:cNvPr>
+          <p:cNvPicPr>
+            <a:picLocks noChangeAspect="1"/>
+          </p:cNvPicPr>
+          <p:nvPr/>
+        </p:nvPicPr>
+        <p:blipFill>
+          <a:blip r:embed="rId1"/>
+          <a:stretch>
+            <a:fillRect/>
+          </a:stretch>
+        </p:blipFill>
+        <p:spPr>
+          <a:xfrm>
+            <a:off x="457200" y="1371600"/>
+            <a:ext cx="8229600" cy="3200400"/>
+          </a:xfrm>
+          <a:prstGeom prst="rect">
+            <a:avLst/>
+          </a:prstGeom>
+        </p:spPr>
+      </p:pic>
+    </p:spTree>
+  </p:cSld>
+  <p:clrMapOvr>
+    <a:masterClrMapping/>
+  </p:clrMapOvr>
+</p:sld>
+</file>
+
+<file path=ppt/slides/slide11.xml><?xml version="1.0" encoding="utf-8"?>
+<p:sld xmlns:a="http://schemas.openxmlformats.org/drawingml/2006/main" xmlns:r="http://schemas.openxmlformats.org/officeDocument/2006/relationships" xmlns:p="http://schemas.openxmlformats.org/presentationml/2006/main">
+  <p:cSld name="Slide 11">
+    <p:bg>
+      <p:bgPr>
+        <a:solidFill>
+          <a:srgbClr val="111827"/>
+        </a:solidFill>
+      </p:bgPr>
+    </p:bg>
+    <p:spTree>
+      <p:nvGrpSpPr>
+        <p:cNvPr id="1" name=""/>
+        <p:cNvGrpSpPr/>
+        <p:nvPr/>
+      </p:nvGrpSpPr>
+      <p:grpSpPr>
+        <a:xfrm>
+          <a:off x="0" y="0"/>
+          <a:ext cx="0" cy="0"/>
+          <a:chOff x="0" y="0"/>
+          <a:chExt cx="0" cy="0"/>
+        </a:xfrm>
+      </p:grpSpPr>
+      <p:sp>
+        <p:nvSpPr>
+          <p:cNvPr id="2" name="Text 0"/>
+          <p:cNvSpPr/>
+          <p:nvPr/>
+        </p:nvSpPr>
+        <p:spPr>
+          <a:xfrm>
+            <a:off x="457200" y="457200"/>
+            <a:ext cx="8229600" cy="731520"/>
+          </a:xfrm>
+          <a:prstGeom prst="rect">
+            <a:avLst/>
+          </a:prstGeom>
+          <a:noFill/>
+          <a:ln/>
+        </p:spPr>
+        <p:txBody>
+          <a:bodyPr wrap="square" rtlCol="0" anchor="ctr"/>
+          <a:lstStyle/>
+          <a:p>
+            <a:pPr indent="0" marL="0">
+              <a:buNone/>
+            </a:pPr>
+            <a:r>
+              <a:rPr lang="en-US" sz="3200" b="1" dirty="0">
+                <a:solidFill>
+                  <a:srgbClr val="DF6D6D"/>
+                </a:solidFill>
+              </a:rPr>
+              <a:t>6. Key Feature Delivery</a:t>
+            </a:r>
+            <a:endParaRPr lang="en-US" sz="3200" dirty="0"/>
+          </a:p>
+        </p:txBody>
+      </p:sp>
+      <p:sp>
+        <p:nvSpPr>
+          <p:cNvPr id="3" name="Text 1"/>
+          <p:cNvSpPr/>
+          <p:nvPr/>
+        </p:nvSpPr>
+        <p:spPr>
+          <a:xfrm>
+            <a:off x="457200" y="1371600"/>
+            <a:ext cx="8229600" cy="457200"/>
+          </a:xfrm>
+          <a:prstGeom prst="rect">
+            <a:avLst/>
+          </a:prstGeom>
+          <a:noFill/>
+          <a:ln/>
+        </p:spPr>
+        <p:txBody>
+          <a:bodyPr wrap="square" rtlCol="0" anchor="ctr"/>
+          <a:lstStyle/>
+          <a:p>
+            <a:pPr marL="342900" indent="-342900">
+              <a:buSzPct val="100000"/>
+              <a:buChar char="•"/>
+            </a:pPr>
+            <a:r>
+              <a:rPr lang="en-US" sz="1800" b="1" dirty="0">
+                <a:solidFill>
+                  <a:srgbClr val="FFFFFF"/>
+                </a:solidFill>
+              </a:rPr>
+              <a:t>Dark Mode (v1.1): </a:t>
+            </a:r>
+            <a:pPr indent="0" marL="0">
+              <a:buNone/>
+            </a:pPr>
+            <a:r>
+              <a:rPr lang="en-US" sz="1800" dirty="0">
+                <a:solidFill>
+                  <a:srgbClr val="9CA3AF"/>
+                </a:solidFill>
+              </a:rPr>
+              <a:t>Config-based theming (Tailwind). Persisted via LocalStorage.</a:t>
+            </a:r>
+            <a:endParaRPr lang="en-US" sz="1800" dirty="0"/>
+          </a:p>
+        </p:txBody>
+      </p:sp>
+      <p:sp>
+        <p:nvSpPr>
+          <p:cNvPr id="4" name="Text 2"/>
+          <p:cNvSpPr/>
+          <p:nvPr/>
+        </p:nvSpPr>
+        <p:spPr>
+          <a:xfrm>
+            <a:off x="457200" y="1920240"/>
+            <a:ext cx="8229600" cy="457200"/>
+          </a:xfrm>
+          <a:prstGeom prst="rect">
+            <a:avLst/>
+          </a:prstGeom>
+          <a:noFill/>
+          <a:ln/>
+        </p:spPr>
+        <p:txBody>
+          <a:bodyPr wrap="square" rtlCol="0" anchor="ctr"/>
+          <a:lstStyle/>
+          <a:p>
+            <a:pPr marL="342900" indent="-342900">
+              <a:buSzPct val="100000"/>
+              <a:buChar char="•"/>
+            </a:pPr>
+            <a:r>
+              <a:rPr lang="en-US" sz="1800" b="1" dirty="0">
+                <a:solidFill>
+                  <a:srgbClr val="FFFFFF"/>
+                </a:solidFill>
+              </a:rPr>
+              <a:t>Status Music: </a:t>
+            </a:r>
+            <a:pPr indent="0" marL="0">
+              <a:buNone/>
+            </a:pPr>
+            <a:r>
+              <a:rPr lang="en-US" sz="1800" dirty="0">
+                <a:solidFill>
+                  <a:srgbClr val="9CA3AF"/>
+                </a:solidFill>
+              </a:rPr>
+              <a:t>Binary data handling. Decision: Client-side IndexedDB (Efficiency).</a:t>
+            </a:r>
+            <a:endParaRPr lang="en-US" sz="1800" dirty="0"/>
+          </a:p>
+        </p:txBody>
+      </p:sp>
+      <p:sp>
+        <p:nvSpPr>
+          <p:cNvPr id="5" name="Text 3"/>
+          <p:cNvSpPr/>
+          <p:nvPr/>
+        </p:nvSpPr>
+        <p:spPr>
+          <a:xfrm>
+            <a:off x="457200" y="2468880"/>
+            <a:ext cx="8229600" cy="457200"/>
+          </a:xfrm>
+          <a:prstGeom prst="rect">
+            <a:avLst/>
+          </a:prstGeom>
+          <a:noFill/>
+          <a:ln/>
+        </p:spPr>
+        <p:txBody>
+          <a:bodyPr wrap="square" rtlCol="0" anchor="ctr"/>
+          <a:lstStyle/>
+          <a:p>
+            <a:pPr marL="342900" indent="-342900">
+              <a:buSzPct val="100000"/>
+              <a:buChar char="•"/>
+            </a:pPr>
+            <a:r>
+              <a:rPr lang="en-US" sz="1800" b="1" dirty="0">
+                <a:solidFill>
+                  <a:srgbClr val="FFFFFF"/>
+                </a:solidFill>
+              </a:rPr>
+              <a:t>v1.5 Releases: </a:t>
+            </a:r>
+            <a:pPr indent="0" marL="0">
+              <a:buNone/>
+            </a:pPr>
+            <a:r>
+              <a:rPr lang="en-US" sz="1800" dirty="0">
+                <a:solidFill>
+                  <a:srgbClr val="9CA3AF"/>
+                </a:solidFill>
+              </a:rPr>
+              <a:t>Agile fixes: Logout Button, Secure Event Deletion.</a:t>
+            </a:r>
+            <a:endParaRPr lang="en-US" sz="1800" dirty="0"/>
+          </a:p>
+        </p:txBody>
+      </p:sp>
+    </p:spTree>
+  </p:cSld>
+  <p:clrMapOvr>
+    <a:masterClrMapping/>
+  </p:clrMapOvr>
+</p:sld>
+</file>
+
+<file path=ppt/slides/slide12.xml><?xml version="1.0" encoding="utf-8"?>
+<p:sld xmlns:a="http://schemas.openxmlformats.org/drawingml/2006/main" xmlns:r="http://schemas.openxmlformats.org/officeDocument/2006/relationships" xmlns:p="http://schemas.openxmlformats.org/presentationml/2006/main">
+  <p:cSld name="Slide 12">
+    <p:bg>
+      <p:bgPr>
+        <a:solidFill>
+          <a:srgbClr val="111827"/>
+        </a:solidFill>
+      </p:bgPr>
+    </p:bg>
+    <p:spTree>
+      <p:nvGrpSpPr>
+        <p:cNvPr id="1" name=""/>
+        <p:cNvGrpSpPr/>
+        <p:nvPr/>
+      </p:nvGrpSpPr>
+      <p:grpSpPr>
+        <a:xfrm>
+          <a:off x="0" y="0"/>
+          <a:ext cx="0" cy="0"/>
+          <a:chOff x="0" y="0"/>
+          <a:chExt cx="0" cy="0"/>
+        </a:xfrm>
+      </p:grpSpPr>
+      <p:sp>
+        <p:nvSpPr>
+          <p:cNvPr id="2" name="Text 0"/>
+          <p:cNvSpPr/>
+          <p:nvPr/>
+        </p:nvSpPr>
+        <p:spPr>
+          <a:xfrm>
+            <a:off x="457200" y="457200"/>
+            <a:ext cx="8229600" cy="731520"/>
+          </a:xfrm>
+          <a:prstGeom prst="rect">
+            <a:avLst/>
+          </a:prstGeom>
+          <a:noFill/>
+          <a:ln/>
+        </p:spPr>
+        <p:txBody>
+          <a:bodyPr wrap="square" rtlCol="0" anchor="ctr"/>
+          <a:lstStyle/>
+          <a:p>
+            <a:pPr indent="0" marL="0">
+              <a:buNone/>
+            </a:pPr>
+            <a:r>
+              <a:rPr lang="en-US" sz="3200" b="1" dirty="0">
+                <a:solidFill>
+                  <a:srgbClr val="DF6D6D"/>
+                </a:solidFill>
+              </a:rPr>
+              <a:t>7. GitHub Usage</a:t>
+            </a:r>
+            <a:endParaRPr lang="en-US" sz="3200" dirty="0"/>
+          </a:p>
+        </p:txBody>
+      </p:sp>
+      <p:sp>
+        <p:nvSpPr>
+          <p:cNvPr id="3" name="Text 1"/>
+          <p:cNvSpPr/>
+          <p:nvPr/>
+        </p:nvSpPr>
+        <p:spPr>
+          <a:xfrm>
+            <a:off x="457200" y="1371600"/>
+            <a:ext cx="8229600" cy="457200"/>
+          </a:xfrm>
+          <a:prstGeom prst="rect">
+            <a:avLst/>
+          </a:prstGeom>
+          <a:noFill/>
+          <a:ln/>
+        </p:spPr>
+        <p:txBody>
+          <a:bodyPr wrap="square" rtlCol="0" anchor="ctr"/>
+          <a:lstStyle/>
+          <a:p>
+            <a:pPr marL="342900" indent="-342900">
+              <a:buSzPct val="100000"/>
+              <a:buChar char="•"/>
+            </a:pPr>
+            <a:r>
+              <a:rPr lang="en-US" sz="1800" dirty="0">
+                <a:solidFill>
+                  <a:srgbClr val="F9FAFB"/>
+                </a:solidFill>
+              </a:rPr>
+              <a:t>Remote Collaboration suitable for teams.</a:t>
+            </a:r>
+            <a:endParaRPr lang="en-US" sz="1800" dirty="0"/>
+          </a:p>
+        </p:txBody>
+      </p:sp>
+      <p:sp>
+        <p:nvSpPr>
+          <p:cNvPr id="4" name="Text 2"/>
+          <p:cNvSpPr/>
+          <p:nvPr/>
+        </p:nvSpPr>
+        <p:spPr>
+          <a:xfrm>
+            <a:off x="457200" y="1920240"/>
+            <a:ext cx="8229600" cy="457200"/>
+          </a:xfrm>
+          <a:prstGeom prst="rect">
+            <a:avLst/>
+          </a:prstGeom>
+          <a:noFill/>
+          <a:ln/>
+        </p:spPr>
+        <p:txBody>
+          <a:bodyPr wrap="square" rtlCol="0" anchor="ctr"/>
+          <a:lstStyle/>
+          <a:p>
+            <a:pPr marL="342900" indent="-342900">
+              <a:buSzPct val="100000"/>
+              <a:buChar char="•"/>
+            </a:pPr>
+            <a:r>
+              <a:rPr lang="en-US" sz="1800" dirty="0">
+                <a:solidFill>
+                  <a:srgbClr val="F9FAFB"/>
+                </a:solidFill>
+              </a:rPr>
+              <a:t>Release Management with Git Tags.</a:t>
+            </a:r>
+            <a:endParaRPr lang="en-US" sz="1800" dirty="0"/>
+          </a:p>
+        </p:txBody>
+      </p:sp>
+      <p:sp>
+        <p:nvSpPr>
+          <p:cNvPr id="5" name="Text 3"/>
+          <p:cNvSpPr/>
+          <p:nvPr/>
+        </p:nvSpPr>
+        <p:spPr>
+          <a:xfrm>
+            <a:off x="457200" y="2468880"/>
+            <a:ext cx="8229600" cy="457200"/>
+          </a:xfrm>
+          <a:prstGeom prst="rect">
+            <a:avLst/>
+          </a:prstGeom>
+          <a:noFill/>
+          <a:ln/>
+        </p:spPr>
+        <p:txBody>
+          <a:bodyPr wrap="square" rtlCol="0" anchor="ctr"/>
+          <a:lstStyle/>
+          <a:p>
+            <a:pPr marL="342900" indent="-342900">
+              <a:buSzPct val="100000"/>
+              <a:buChar char="•"/>
+            </a:pPr>
+            <a:r>
+              <a:rPr lang="en-US" sz="1800" dirty="0">
+                <a:solidFill>
+                  <a:srgbClr val="F9FAFB"/>
+                </a:solidFill>
+              </a:rPr>
+              <a:t>Comprehensive Documentation (README w/ Badges).</a:t>
+            </a:r>
+            <a:endParaRPr lang="en-US" sz="1800" dirty="0"/>
+          </a:p>
+        </p:txBody>
+      </p:sp>
+    </p:spTree>
+  </p:cSld>
+  <p:clrMapOvr>
+    <a:masterClrMapping/>
+  </p:clrMapOvr>
+</p:sld>
+</file>
+
+<file path=ppt/slides/slide13.xml><?xml version="1.0" encoding="utf-8"?>
+<p:sld xmlns:a="http://schemas.openxmlformats.org/drawingml/2006/main" xmlns:r="http://schemas.openxmlformats.org/officeDocument/2006/relationships" xmlns:p="http://schemas.openxmlformats.org/presentationml/2006/main">
+  <p:cSld name="Slide 13">
+    <p:bg>
+      <p:bgPr>
+        <a:solidFill>
+          <a:srgbClr val="111827"/>
+        </a:solidFill>
+      </p:bgPr>
+    </p:bg>
+    <p:spTree>
+      <p:nvGrpSpPr>
+        <p:cNvPr id="1" name=""/>
+        <p:cNvGrpSpPr/>
+        <p:nvPr/>
+      </p:nvGrpSpPr>
+      <p:grpSpPr>
+        <a:xfrm>
+          <a:off x="0" y="0"/>
+          <a:ext cx="0" cy="0"/>
+          <a:chOff x="0" y="0"/>
+          <a:chExt cx="0" cy="0"/>
+        </a:xfrm>
+      </p:grpSpPr>
+      <p:sp>
+        <p:nvSpPr>
+          <p:cNvPr id="2" name="Text 0"/>
+          <p:cNvSpPr/>
+          <p:nvPr/>
+        </p:nvSpPr>
+        <p:spPr>
+          <a:xfrm>
+            <a:off x="457200" y="457200"/>
+            <a:ext cx="8229600" cy="731520"/>
+          </a:xfrm>
+          <a:prstGeom prst="rect">
+            <a:avLst/>
+          </a:prstGeom>
+          <a:noFill/>
+          <a:ln/>
+        </p:spPr>
+        <p:txBody>
+          <a:bodyPr wrap="square" rtlCol="0" anchor="ctr"/>
+          <a:lstStyle/>
+          <a:p>
+            <a:pPr indent="0" marL="0">
+              <a:buNone/>
+            </a:pPr>
+            <a:r>
+              <a:rPr lang="en-US" sz="3200" b="1" dirty="0">
+                <a:solidFill>
+                  <a:srgbClr val="DF6D6D"/>
+                </a:solidFill>
+              </a:rPr>
               <a:t>8. Conclusion</a:t>
             </a:r>
             <a:endParaRPr lang="en-US" sz="3200" dirty="0"/>
@@ -3029,7 +3779,7 @@
                   <a:srgbClr val="DF6D6D"/>
                 </a:solidFill>
               </a:rPr>
-              <a:t>5. Version Control Strategy</a:t>
+              <a:t>5.1 Version Control: Why Git?</a:t>
             </a:r>
             <a:endParaRPr lang="en-US" sz="3200" dirty="0"/>
           </a:p>
@@ -3066,7 +3816,7 @@
                   <a:srgbClr val="FFFFFF"/>
                 </a:solidFill>
               </a:rPr>
-              <a:t>Feature Branch Workflow: </a:t>
+              <a:t>Safety Net: </a:t>
             </a:r>
             <a:pPr indent="0" marL="0">
               <a:buNone/>
@@ -3077,7 +3827,7 @@
                   <a:srgbClr val="9CA3AF"/>
                 </a:solidFill>
               </a:rPr>
-              <a:t>Isolated branches per feature (main, dark-mode, status-music).</a:t>
+              <a:t>Every change is tracked. 'git reflog' saves us from mistakes.</a:t>
             </a:r>
             <a:endParaRPr lang="en-US" sz="1800" dirty="0"/>
           </a:p>
@@ -3114,7 +3864,7 @@
                   <a:srgbClr val="FFFFFF"/>
                 </a:solidFill>
               </a:rPr>
-              <a:t>Rebase vs Merge: </a:t>
+              <a:t>Collaboration: </a:t>
             </a:r>
             <a:pPr indent="0" marL="0">
               <a:buNone/>
@@ -3125,7 +3875,7 @@
                   <a:srgbClr val="9CA3AF"/>
                 </a:solidFill>
               </a:rPr>
-              <a:t>Used 'git rebase' to maintain linear history and avoid merge bubbles.</a:t>
+              <a:t>Enables multiple developers (or feature branches) to work in parallel.</a:t>
             </a:r>
             <a:endParaRPr lang="en-US" sz="1800" dirty="0"/>
           </a:p>
@@ -3162,7 +3912,7 @@
                   <a:srgbClr val="FFFFFF"/>
                 </a:solidFill>
               </a:rPr>
-              <a:t>Integration: </a:t>
+              <a:t>Code Integrity: </a:t>
             </a:r>
             <a:pPr indent="0" marL="0">
               <a:buNone/>
@@ -3173,7 +3923,7 @@
                   <a:srgbClr val="9CA3AF"/>
                 </a:solidFill>
               </a:rPr>
-              <a:t>Fast-Forward merges for clean deployment.</a:t>
+              <a:t>Ensures production code (`main`) remains stable while features are tested elsewhere.</a:t>
             </a:r>
             <a:endParaRPr lang="en-US" sz="1800" dirty="0"/>
           </a:p>
@@ -3241,36 +3991,204 @@
                   <a:srgbClr val="DF6D6D"/>
                 </a:solidFill>
               </a:rPr>
-              <a:t>Git Workflow Visualized</a:t>
+              <a:t>5.2 Branching Strategy</a:t>
             </a:r>
             <a:endParaRPr lang="en-US" sz="3200" dirty="0"/>
           </a:p>
         </p:txBody>
       </p:sp>
-      <p:pic>
-        <p:nvPicPr>
-          <p:cNvPr id="3" name="Image 0" descr="workflow_chart.png">    </p:cNvPr>
-          <p:cNvPicPr>
-            <a:picLocks noChangeAspect="1"/>
-          </p:cNvPicPr>
-          <p:nvPr/>
-        </p:nvPicPr>
-        <p:blipFill>
-          <a:blip r:embed="rId1"/>
-          <a:stretch>
-            <a:fillRect/>
-          </a:stretch>
-        </p:blipFill>
+      <p:sp>
+        <p:nvSpPr>
+          <p:cNvPr id="3" name="Text 1"/>
+          <p:cNvSpPr/>
+          <p:nvPr/>
+        </p:nvSpPr>
         <p:spPr>
           <a:xfrm>
             <a:off x="457200" y="1371600"/>
-            <a:ext cx="8229600" cy="3200400"/>
-          </a:xfrm>
-          <a:prstGeom prst="rect">
-            <a:avLst/>
-          </a:prstGeom>
-        </p:spPr>
-      </p:pic>
+            <a:ext cx="8229600" cy="457200"/>
+          </a:xfrm>
+          <a:prstGeom prst="rect">
+            <a:avLst/>
+          </a:prstGeom>
+          <a:noFill/>
+          <a:ln/>
+        </p:spPr>
+        <p:txBody>
+          <a:bodyPr wrap="square" rtlCol="0" anchor="ctr"/>
+          <a:lstStyle/>
+          <a:p>
+            <a:pPr marL="342900" indent="-342900">
+              <a:buSzPct val="100000"/>
+              <a:buChar char="•"/>
+            </a:pPr>
+            <a:r>
+              <a:rPr lang="en-US" sz="1800" b="1" dirty="0">
+                <a:solidFill>
+                  <a:srgbClr val="FFFFFF"/>
+                </a:solidFill>
+              </a:rPr>
+              <a:t>main: </a:t>
+            </a:r>
+            <a:pPr indent="0" marL="0">
+              <a:buNone/>
+            </a:pPr>
+            <a:r>
+              <a:rPr lang="en-US" sz="1800" dirty="0">
+                <a:solidFill>
+                  <a:srgbClr val="9CA3AF"/>
+                </a:solidFill>
+              </a:rPr>
+              <a:t>The 'Golden Copy'. Only stable, tested code lands here.</a:t>
+            </a:r>
+            <a:endParaRPr lang="en-US" sz="1800" dirty="0"/>
+          </a:p>
+        </p:txBody>
+      </p:sp>
+      <p:sp>
+        <p:nvSpPr>
+          <p:cNvPr id="4" name="Text 2"/>
+          <p:cNvSpPr/>
+          <p:nvPr/>
+        </p:nvSpPr>
+        <p:spPr>
+          <a:xfrm>
+            <a:off x="457200" y="1920240"/>
+            <a:ext cx="8229600" cy="457200"/>
+          </a:xfrm>
+          <a:prstGeom prst="rect">
+            <a:avLst/>
+          </a:prstGeom>
+          <a:noFill/>
+          <a:ln/>
+        </p:spPr>
+        <p:txBody>
+          <a:bodyPr wrap="square" rtlCol="0" anchor="ctr"/>
+          <a:lstStyle/>
+          <a:p>
+            <a:pPr marL="342900" indent="-342900">
+              <a:buSzPct val="100000"/>
+              <a:buChar char="•"/>
+            </a:pPr>
+            <a:r>
+              <a:rPr lang="en-US" sz="1800" b="1" dirty="0">
+                <a:solidFill>
+                  <a:srgbClr val="FFFFFF"/>
+                </a:solidFill>
+              </a:rPr>
+              <a:t>v1.1 (Dark Mode): </a:t>
+            </a:r>
+            <a:pPr indent="0" marL="0">
+              <a:buNone/>
+            </a:pPr>
+            <a:r>
+              <a:rPr lang="en-US" sz="1800" dirty="0">
+                <a:solidFill>
+                  <a:srgbClr val="9CA3AF"/>
+                </a:solidFill>
+              </a:rPr>
+              <a:t>Isolated logic for theming. Prevents CSS bugs from affecting main app.</a:t>
+            </a:r>
+            <a:endParaRPr lang="en-US" sz="1800" dirty="0"/>
+          </a:p>
+        </p:txBody>
+      </p:sp>
+      <p:sp>
+        <p:nvSpPr>
+          <p:cNvPr id="5" name="Text 3"/>
+          <p:cNvSpPr/>
+          <p:nvPr/>
+        </p:nvSpPr>
+        <p:spPr>
+          <a:xfrm>
+            <a:off x="457200" y="2468880"/>
+            <a:ext cx="8229600" cy="457200"/>
+          </a:xfrm>
+          <a:prstGeom prst="rect">
+            <a:avLst/>
+          </a:prstGeom>
+          <a:noFill/>
+          <a:ln/>
+        </p:spPr>
+        <p:txBody>
+          <a:bodyPr wrap="square" rtlCol="0" anchor="ctr"/>
+          <a:lstStyle/>
+          <a:p>
+            <a:pPr marL="342900" indent="-342900">
+              <a:buSzPct val="100000"/>
+              <a:buChar char="•"/>
+            </a:pPr>
+            <a:r>
+              <a:rPr lang="en-US" sz="1800" b="1" dirty="0">
+                <a:solidFill>
+                  <a:srgbClr val="FFFFFF"/>
+                </a:solidFill>
+              </a:rPr>
+              <a:t>v1.2 (Status Music): </a:t>
+            </a:r>
+            <a:pPr indent="0" marL="0">
+              <a:buNone/>
+            </a:pPr>
+            <a:r>
+              <a:rPr lang="en-US" sz="1800" dirty="0">
+                <a:solidFill>
+                  <a:srgbClr val="9CA3AF"/>
+                </a:solidFill>
+              </a:rPr>
+              <a:t>Experimental features (IndexedDB) kept separate until proven stable.</a:t>
+            </a:r>
+            <a:endParaRPr lang="en-US" sz="1800" dirty="0"/>
+          </a:p>
+        </p:txBody>
+      </p:sp>
+      <p:sp>
+        <p:nvSpPr>
+          <p:cNvPr id="6" name="Text 4"/>
+          <p:cNvSpPr/>
+          <p:nvPr/>
+        </p:nvSpPr>
+        <p:spPr>
+          <a:xfrm>
+            <a:off x="457200" y="3017520"/>
+            <a:ext cx="8229600" cy="457200"/>
+          </a:xfrm>
+          <a:prstGeom prst="rect">
+            <a:avLst/>
+          </a:prstGeom>
+          <a:noFill/>
+          <a:ln/>
+        </p:spPr>
+        <p:txBody>
+          <a:bodyPr wrap="square" rtlCol="0" anchor="ctr"/>
+          <a:lstStyle/>
+          <a:p>
+            <a:pPr marL="342900" indent="-342900">
+              <a:buSzPct val="100000"/>
+              <a:buChar char="•"/>
+            </a:pPr>
+            <a:r>
+              <a:rPr lang="en-US" sz="1800" b="1" dirty="0">
+                <a:solidFill>
+                  <a:srgbClr val="FFFFFF"/>
+                </a:solidFill>
+              </a:rPr>
+              <a:t>v1.5 (Polishing): </a:t>
+            </a:r>
+            <a:pPr indent="0" marL="0">
+              <a:buNone/>
+            </a:pPr>
+            <a:r>
+              <a:rPr lang="en-US" sz="1800" dirty="0">
+                <a:solidFill>
+                  <a:srgbClr val="9CA3AF"/>
+                </a:solidFill>
+              </a:rPr>
+              <a:t>Release prep, bug fixes, and final touches.</a:t>
+            </a:r>
+            <a:endParaRPr lang="en-US" sz="1800" dirty="0"/>
+          </a:p>
+        </p:txBody>
+      </p:sp>
     </p:spTree>
   </p:cSld>
   <p:clrMapOvr>
@@ -3333,7 +4251,7 @@
                   <a:srgbClr val="DF6D6D"/>
                 </a:solidFill>
               </a:rPr>
-              <a:t>6. Key Feature Delivery</a:t>
+              <a:t>5.3 DevOps Logic: Rebase over Merge</a:t>
             </a:r>
             <a:endParaRPr lang="en-US" sz="3200" dirty="0"/>
           </a:p>
@@ -3370,7 +4288,7 @@
                   <a:srgbClr val="FFFFFF"/>
                 </a:solidFill>
               </a:rPr>
-              <a:t>Dark Mode (v1.1): </a:t>
+              <a:t>The Problem: </a:t>
             </a:r>
             <a:pPr indent="0" marL="0">
               <a:buNone/>
@@ -3381,7 +4299,7 @@
                   <a:srgbClr val="9CA3AF"/>
                 </a:solidFill>
               </a:rPr>
-              <a:t>Config-based theming (Tailwind). Persisted via LocalStorage.</a:t>
+              <a:t>Standard merges create 'commit bubbles' and messy history.</a:t>
             </a:r>
             <a:endParaRPr lang="en-US" sz="1800" dirty="0"/>
           </a:p>
@@ -3418,7 +4336,7 @@
                   <a:srgbClr val="FFFFFF"/>
                 </a:solidFill>
               </a:rPr>
-              <a:t>Status Music: </a:t>
+              <a:t>The Solution: </a:t>
             </a:r>
             <a:pPr indent="0" marL="0">
               <a:buNone/>
@@ -3429,7 +4347,7 @@
                   <a:srgbClr val="9CA3AF"/>
                 </a:solidFill>
               </a:rPr>
-              <a:t>Binary data handling. Decision: Client-side IndexedDB (Efficiency).</a:t>
+              <a:t>`git rebase main` moves feature commits on TOP of the latest main.</a:t>
             </a:r>
             <a:endParaRPr lang="en-US" sz="1800" dirty="0"/>
           </a:p>
@@ -3466,7 +4384,7 @@
                   <a:srgbClr val="FFFFFF"/>
                 </a:solidFill>
               </a:rPr>
-              <a:t>v1.5 Releases: </a:t>
+              <a:t>Benefit: </a:t>
             </a:r>
             <a:pPr indent="0" marL="0">
               <a:buNone/>
@@ -3477,7 +4395,7 @@
                   <a:srgbClr val="9CA3AF"/>
                 </a:solidFill>
               </a:rPr>
-              <a:t>Agile fixes: Logout Button, Secure Event Deletion.</a:t>
+              <a:t>Linear History. Makes tracking bugs (`git bisect`) and code reviews much easier.</a:t>
             </a:r>
             <a:endParaRPr lang="en-US" sz="1800" dirty="0"/>
           </a:p>
@@ -3545,7 +4463,7 @@
                   <a:srgbClr val="DF6D6D"/>
                 </a:solidFill>
               </a:rPr>
-              <a:t>7. GitHub Usage</a:t>
+              <a:t>5.4 GitHub Power Tools</a:t>
             </a:r>
             <a:endParaRPr lang="en-US" sz="3200" dirty="0"/>
           </a:p>
@@ -3577,12 +4495,23 @@
               <a:buChar char="•"/>
             </a:pPr>
             <a:r>
+              <a:rPr lang="en-US" sz="1800" b="1" dirty="0">
+                <a:solidFill>
+                  <a:srgbClr val="FFFFFF"/>
+                </a:solidFill>
+              </a:rPr>
+              <a:t>Semantic Commits: </a:t>
+            </a:r>
+            <a:pPr indent="0" marL="0">
+              <a:buNone/>
+            </a:pPr>
+            <a:r>
               <a:rPr lang="en-US" sz="1800" dirty="0">
                 <a:solidFill>
-                  <a:srgbClr val="F9FAFB"/>
-                </a:solidFill>
-              </a:rPr>
-              <a:t>Remote Collaboration suitable for teams.</a:t>
+                  <a:srgbClr val="9CA3AF"/>
+                </a:solidFill>
+              </a:rPr>
+              <a:t>Using `feat:`, `fix:`, `docs:` prefixes for clarity.</a:t>
             </a:r>
             <a:endParaRPr lang="en-US" sz="1800" dirty="0"/>
           </a:p>
@@ -3614,12 +4543,23 @@
               <a:buChar char="•"/>
             </a:pPr>
             <a:r>
+              <a:rPr lang="en-US" sz="1800" b="1" dirty="0">
+                <a:solidFill>
+                  <a:srgbClr val="FFFFFF"/>
+                </a:solidFill>
+              </a:rPr>
+              <a:t>Release Tags: </a:t>
+            </a:r>
+            <a:pPr indent="0" marL="0">
+              <a:buNone/>
+            </a:pPr>
+            <a:r>
               <a:rPr lang="en-US" sz="1800" dirty="0">
                 <a:solidFill>
-                  <a:srgbClr val="F9FAFB"/>
-                </a:solidFill>
-              </a:rPr>
-              <a:t>Release Management with Git Tags.</a:t>
+                  <a:srgbClr val="9CA3AF"/>
+                </a:solidFill>
+              </a:rPr>
+              <a:t>Using `git tag v1.5` to mark specific deployment points.</a:t>
             </a:r>
             <a:endParaRPr lang="en-US" sz="1800" dirty="0"/>
           </a:p>
@@ -3651,12 +4591,23 @@
               <a:buChar char="•"/>
             </a:pPr>
             <a:r>
+              <a:rPr lang="en-US" sz="1800" b="1" dirty="0">
+                <a:solidFill>
+                  <a:srgbClr val="FFFFFF"/>
+                </a:solidFill>
+              </a:rPr>
+              <a:t>Remote Backup: </a:t>
+            </a:r>
+            <a:pPr indent="0" marL="0">
+              <a:buNone/>
+            </a:pPr>
+            <a:r>
               <a:rPr lang="en-US" sz="1800" dirty="0">
                 <a:solidFill>
-                  <a:srgbClr val="F9FAFB"/>
-                </a:solidFill>
-              </a:rPr>
-              <a:t>Comprehensive Documentation (README w/ Badges).</a:t>
+                  <a:srgbClr val="9CA3AF"/>
+                </a:solidFill>
+              </a:rPr>
+              <a:t>Decentralized code storage ensures no data loss.</a:t>
             </a:r>
             <a:endParaRPr lang="en-US" sz="1800" dirty="0"/>
           </a:p>

</xml_diff>

<commit_message>
docs: add table of contents to presentation
</commit_message>
<xml_diff>
--- a/CircleUp_Presentation.pptx
+++ b/CircleUp_Presentation.pptx
@@ -18,9 +18,10 @@
     <p:sldId id="266" r:id="rId12"/>
     <p:sldId id="267" r:id="rId13"/>
     <p:sldId id="268" r:id="rId14"/>
+    <p:sldId id="269" r:id="rId15"/>
   </p:sldIdLst>
   <p:notesMasterIdLst>
-    <p:notesMasterId r:id="rId15"/>
+    <p:notesMasterId r:id="rId16"/>
   </p:notesMasterIdLst>
   <p:sldSz cx="9144000" cy="5143500"/>
   <p:notesSz cx="5143500" cy="9144000"/>
@@ -890,6 +891,94 @@
             <a:fld id="{F7021451-1387-4CA6-816F-3879F97B5CBC}" type="slidenum">
               <a:rPr lang="en-US"/>
               <a:t>13</a:t>
+            </a:fld>
+            <a:endParaRPr lang="en-US"/>
+          </a:p>
+        </p:txBody>
+      </p:sp>
+    </p:spTree>
+    <p:extLst>
+      <p:ext uri="{BB962C8B-B14F-4D97-AF65-F5344CB8AC3E}">
+        <p14:creationId xmlns:p14="http://schemas.microsoft.com/office/powerpoint/2010/main" val="1024086991"/>
+      </p:ext>
+    </p:extLst>
+  </p:cSld>
+  <p:clrMapOvr>
+    <a:masterClrMapping/>
+  </p:clrMapOvr>
+</p:notes>
+</file>
+
+<file path=ppt/notesSlides/notesSlide14.xml><?xml version="1.0" encoding="utf-8"?>
+<p:notes xmlns:a="http://schemas.openxmlformats.org/drawingml/2006/main" xmlns:r="http://schemas.openxmlformats.org/officeDocument/2006/relationships" xmlns:p="http://schemas.openxmlformats.org/presentationml/2006/main">
+  <p:cSld>
+    <p:spTree>
+      <p:nvGrpSpPr>
+        <p:cNvPr id="1" name=""/>
+        <p:cNvGrpSpPr/>
+        <p:nvPr/>
+      </p:nvGrpSpPr>
+      <p:grpSpPr>
+        <a:xfrm>
+          <a:off x="0" y="0"/>
+          <a:ext cx="0" cy="0"/>
+          <a:chOff x="0" y="0"/>
+          <a:chExt cx="0" cy="0"/>
+        </a:xfrm>
+      </p:grpSpPr>
+      <p:sp>
+        <p:nvSpPr>
+          <p:cNvPr id="2" name="Slide Image Placeholder 1"/>
+          <p:cNvSpPr>
+            <a:spLocks noGrp="1" noRot="1" noChangeAspect="1"/>
+          </p:cNvSpPr>
+          <p:nvPr>
+            <p:ph type="sldImg"/>
+          </p:nvPr>
+        </p:nvSpPr>
+        <p:spPr/>
+      </p:sp>
+      <p:sp>
+        <p:nvSpPr>
+          <p:cNvPr id="3" name="Notes Placeholder 2"/>
+          <p:cNvSpPr>
+            <a:spLocks noGrp="1"/>
+          </p:cNvSpPr>
+          <p:nvPr>
+            <p:ph type="body" idx="1"/>
+          </p:nvPr>
+        </p:nvSpPr>
+        <p:spPr/>
+        <p:txBody>
+          <a:bodyPr/>
+          <a:lstStyle/>
+          <a:p>
+            <a:r>
+              <a:rPr lang="en-US" dirty="0"/>
+              <a:t/>
+            </a:r>
+            <a:endParaRPr lang="en-US" dirty="0"/>
+          </a:p>
+        </p:txBody>
+      </p:sp>
+      <p:sp>
+        <p:nvSpPr>
+          <p:cNvPr id="4" name="Slide Number Placeholder 3"/>
+          <p:cNvSpPr>
+            <a:spLocks noGrp="1"/>
+          </p:cNvSpPr>
+          <p:nvPr>
+            <p:ph type="sldNum" sz="quarter" idx="10"/>
+          </p:nvPr>
+        </p:nvSpPr>
+        <p:spPr/>
+        <p:txBody>
+          <a:bodyPr/>
+          <a:lstStyle/>
+          <a:p>
+            <a:fld id="{F7021451-1387-4CA6-816F-3879F97B5CBC}" type="slidenum">
+              <a:rPr lang="en-US"/>
+              <a:t>14</a:t>
             </a:fld>
             <a:endParaRPr lang="en-US"/>
           </a:p>
@@ -2077,36 +2166,156 @@
                   <a:srgbClr val="DF6D6D"/>
                 </a:solidFill>
               </a:rPr>
-              <a:t>Git Workflow Visualized</a:t>
+              <a:t>6.4 GitHub Power Tools</a:t>
             </a:r>
             <a:endParaRPr lang="en-US" sz="3200" dirty="0"/>
           </a:p>
         </p:txBody>
       </p:sp>
-      <p:pic>
-        <p:nvPicPr>
-          <p:cNvPr id="3" name="Image 0" descr="workflow_chart.png">    </p:cNvPr>
-          <p:cNvPicPr>
-            <a:picLocks noChangeAspect="1"/>
-          </p:cNvPicPr>
-          <p:nvPr/>
-        </p:nvPicPr>
-        <p:blipFill>
-          <a:blip r:embed="rId1"/>
-          <a:stretch>
-            <a:fillRect/>
-          </a:stretch>
-        </p:blipFill>
+      <p:sp>
+        <p:nvSpPr>
+          <p:cNvPr id="3" name="Text 1"/>
+          <p:cNvSpPr/>
+          <p:nvPr/>
+        </p:nvSpPr>
         <p:spPr>
           <a:xfrm>
             <a:off x="457200" y="1371600"/>
-            <a:ext cx="8229600" cy="3200400"/>
-          </a:xfrm>
-          <a:prstGeom prst="rect">
-            <a:avLst/>
-          </a:prstGeom>
-        </p:spPr>
-      </p:pic>
+            <a:ext cx="8229600" cy="457200"/>
+          </a:xfrm>
+          <a:prstGeom prst="rect">
+            <a:avLst/>
+          </a:prstGeom>
+          <a:noFill/>
+          <a:ln/>
+        </p:spPr>
+        <p:txBody>
+          <a:bodyPr wrap="square" rtlCol="0" anchor="ctr"/>
+          <a:lstStyle/>
+          <a:p>
+            <a:pPr marL="342900" indent="-342900">
+              <a:buSzPct val="100000"/>
+              <a:buChar char="•"/>
+            </a:pPr>
+            <a:r>
+              <a:rPr lang="en-US" sz="1800" b="1" dirty="0">
+                <a:solidFill>
+                  <a:srgbClr val="FFFFFF"/>
+                </a:solidFill>
+              </a:rPr>
+              <a:t>Semantic Commits: </a:t>
+            </a:r>
+            <a:pPr indent="0" marL="0">
+              <a:buNone/>
+            </a:pPr>
+            <a:r>
+              <a:rPr lang="en-US" sz="1800" dirty="0">
+                <a:solidFill>
+                  <a:srgbClr val="9CA3AF"/>
+                </a:solidFill>
+              </a:rPr>
+              <a:t>Using `feat:`, `fix:`, `docs:` prefixes for clarity.</a:t>
+            </a:r>
+            <a:endParaRPr lang="en-US" sz="1800" dirty="0"/>
+          </a:p>
+        </p:txBody>
+      </p:sp>
+      <p:sp>
+        <p:nvSpPr>
+          <p:cNvPr id="4" name="Text 2"/>
+          <p:cNvSpPr/>
+          <p:nvPr/>
+        </p:nvSpPr>
+        <p:spPr>
+          <a:xfrm>
+            <a:off x="457200" y="1920240"/>
+            <a:ext cx="8229600" cy="457200"/>
+          </a:xfrm>
+          <a:prstGeom prst="rect">
+            <a:avLst/>
+          </a:prstGeom>
+          <a:noFill/>
+          <a:ln/>
+        </p:spPr>
+        <p:txBody>
+          <a:bodyPr wrap="square" rtlCol="0" anchor="ctr"/>
+          <a:lstStyle/>
+          <a:p>
+            <a:pPr marL="342900" indent="-342900">
+              <a:buSzPct val="100000"/>
+              <a:buChar char="•"/>
+            </a:pPr>
+            <a:r>
+              <a:rPr lang="en-US" sz="1800" b="1" dirty="0">
+                <a:solidFill>
+                  <a:srgbClr val="FFFFFF"/>
+                </a:solidFill>
+              </a:rPr>
+              <a:t>Release Tags: </a:t>
+            </a:r>
+            <a:pPr indent="0" marL="0">
+              <a:buNone/>
+            </a:pPr>
+            <a:r>
+              <a:rPr lang="en-US" sz="1800" dirty="0">
+                <a:solidFill>
+                  <a:srgbClr val="9CA3AF"/>
+                </a:solidFill>
+              </a:rPr>
+              <a:t>Using `git tag v1.5` to mark specific deployment points.</a:t>
+            </a:r>
+            <a:endParaRPr lang="en-US" sz="1800" dirty="0"/>
+          </a:p>
+        </p:txBody>
+      </p:sp>
+      <p:sp>
+        <p:nvSpPr>
+          <p:cNvPr id="5" name="Text 3"/>
+          <p:cNvSpPr/>
+          <p:nvPr/>
+        </p:nvSpPr>
+        <p:spPr>
+          <a:xfrm>
+            <a:off x="457200" y="2468880"/>
+            <a:ext cx="8229600" cy="457200"/>
+          </a:xfrm>
+          <a:prstGeom prst="rect">
+            <a:avLst/>
+          </a:prstGeom>
+          <a:noFill/>
+          <a:ln/>
+        </p:spPr>
+        <p:txBody>
+          <a:bodyPr wrap="square" rtlCol="0" anchor="ctr"/>
+          <a:lstStyle/>
+          <a:p>
+            <a:pPr marL="342900" indent="-342900">
+              <a:buSzPct val="100000"/>
+              <a:buChar char="•"/>
+            </a:pPr>
+            <a:r>
+              <a:rPr lang="en-US" sz="1800" b="1" dirty="0">
+                <a:solidFill>
+                  <a:srgbClr val="FFFFFF"/>
+                </a:solidFill>
+              </a:rPr>
+              <a:t>Remote Backup: </a:t>
+            </a:r>
+            <a:pPr indent="0" marL="0">
+              <a:buNone/>
+            </a:pPr>
+            <a:r>
+              <a:rPr lang="en-US" sz="1800" dirty="0">
+                <a:solidFill>
+                  <a:srgbClr val="9CA3AF"/>
+                </a:solidFill>
+              </a:rPr>
+              <a:t>Decentralized code storage ensures no data loss.</a:t>
+            </a:r>
+            <a:endParaRPr lang="en-US" sz="1800" dirty="0"/>
+          </a:p>
+        </p:txBody>
+      </p:sp>
     </p:spTree>
   </p:cSld>
   <p:clrMapOvr>
@@ -2169,156 +2378,36 @@
                   <a:srgbClr val="DF6D6D"/>
                 </a:solidFill>
               </a:rPr>
-              <a:t>6. Key Feature Delivery</a:t>
+              <a:t>Git Workflow Visualized</a:t>
             </a:r>
             <a:endParaRPr lang="en-US" sz="3200" dirty="0"/>
           </a:p>
         </p:txBody>
       </p:sp>
-      <p:sp>
-        <p:nvSpPr>
-          <p:cNvPr id="3" name="Text 1"/>
-          <p:cNvSpPr/>
-          <p:nvPr/>
-        </p:nvSpPr>
+      <p:pic>
+        <p:nvPicPr>
+          <p:cNvPr id="3" name="Image 0" descr="workflow_chart.png">    </p:cNvPr>
+          <p:cNvPicPr>
+            <a:picLocks noChangeAspect="1"/>
+          </p:cNvPicPr>
+          <p:nvPr/>
+        </p:nvPicPr>
+        <p:blipFill>
+          <a:blip r:embed="rId1"/>
+          <a:stretch>
+            <a:fillRect/>
+          </a:stretch>
+        </p:blipFill>
         <p:spPr>
           <a:xfrm>
             <a:off x="457200" y="1371600"/>
-            <a:ext cx="8229600" cy="457200"/>
-          </a:xfrm>
-          <a:prstGeom prst="rect">
-            <a:avLst/>
-          </a:prstGeom>
-          <a:noFill/>
-          <a:ln/>
-        </p:spPr>
-        <p:txBody>
-          <a:bodyPr wrap="square" rtlCol="0" anchor="ctr"/>
-          <a:lstStyle/>
-          <a:p>
-            <a:pPr marL="342900" indent="-342900">
-              <a:buSzPct val="100000"/>
-              <a:buChar char="•"/>
-            </a:pPr>
-            <a:r>
-              <a:rPr lang="en-US" sz="1800" b="1" dirty="0">
-                <a:solidFill>
-                  <a:srgbClr val="FFFFFF"/>
-                </a:solidFill>
-              </a:rPr>
-              <a:t>Dark Mode (v1.1): </a:t>
-            </a:r>
-            <a:pPr indent="0" marL="0">
-              <a:buNone/>
-            </a:pPr>
-            <a:r>
-              <a:rPr lang="en-US" sz="1800" dirty="0">
-                <a:solidFill>
-                  <a:srgbClr val="9CA3AF"/>
-                </a:solidFill>
-              </a:rPr>
-              <a:t>Config-based theming (Tailwind). Persisted via LocalStorage.</a:t>
-            </a:r>
-            <a:endParaRPr lang="en-US" sz="1800" dirty="0"/>
-          </a:p>
-        </p:txBody>
-      </p:sp>
-      <p:sp>
-        <p:nvSpPr>
-          <p:cNvPr id="4" name="Text 2"/>
-          <p:cNvSpPr/>
-          <p:nvPr/>
-        </p:nvSpPr>
-        <p:spPr>
-          <a:xfrm>
-            <a:off x="457200" y="1920240"/>
-            <a:ext cx="8229600" cy="457200"/>
-          </a:xfrm>
-          <a:prstGeom prst="rect">
-            <a:avLst/>
-          </a:prstGeom>
-          <a:noFill/>
-          <a:ln/>
-        </p:spPr>
-        <p:txBody>
-          <a:bodyPr wrap="square" rtlCol="0" anchor="ctr"/>
-          <a:lstStyle/>
-          <a:p>
-            <a:pPr marL="342900" indent="-342900">
-              <a:buSzPct val="100000"/>
-              <a:buChar char="•"/>
-            </a:pPr>
-            <a:r>
-              <a:rPr lang="en-US" sz="1800" b="1" dirty="0">
-                <a:solidFill>
-                  <a:srgbClr val="FFFFFF"/>
-                </a:solidFill>
-              </a:rPr>
-              <a:t>Status Music: </a:t>
-            </a:r>
-            <a:pPr indent="0" marL="0">
-              <a:buNone/>
-            </a:pPr>
-            <a:r>
-              <a:rPr lang="en-US" sz="1800" dirty="0">
-                <a:solidFill>
-                  <a:srgbClr val="9CA3AF"/>
-                </a:solidFill>
-              </a:rPr>
-              <a:t>Binary data handling. Decision: Client-side IndexedDB (Efficiency).</a:t>
-            </a:r>
-            <a:endParaRPr lang="en-US" sz="1800" dirty="0"/>
-          </a:p>
-        </p:txBody>
-      </p:sp>
-      <p:sp>
-        <p:nvSpPr>
-          <p:cNvPr id="5" name="Text 3"/>
-          <p:cNvSpPr/>
-          <p:nvPr/>
-        </p:nvSpPr>
-        <p:spPr>
-          <a:xfrm>
-            <a:off x="457200" y="2468880"/>
-            <a:ext cx="8229600" cy="457200"/>
-          </a:xfrm>
-          <a:prstGeom prst="rect">
-            <a:avLst/>
-          </a:prstGeom>
-          <a:noFill/>
-          <a:ln/>
-        </p:spPr>
-        <p:txBody>
-          <a:bodyPr wrap="square" rtlCol="0" anchor="ctr"/>
-          <a:lstStyle/>
-          <a:p>
-            <a:pPr marL="342900" indent="-342900">
-              <a:buSzPct val="100000"/>
-              <a:buChar char="•"/>
-            </a:pPr>
-            <a:r>
-              <a:rPr lang="en-US" sz="1800" b="1" dirty="0">
-                <a:solidFill>
-                  <a:srgbClr val="FFFFFF"/>
-                </a:solidFill>
-              </a:rPr>
-              <a:t>v1.5 Releases: </a:t>
-            </a:r>
-            <a:pPr indent="0" marL="0">
-              <a:buNone/>
-            </a:pPr>
-            <a:r>
-              <a:rPr lang="en-US" sz="1800" dirty="0">
-                <a:solidFill>
-                  <a:srgbClr val="9CA3AF"/>
-                </a:solidFill>
-              </a:rPr>
-              <a:t>Agile fixes: Logout Button, Secure Event Deletion.</a:t>
-            </a:r>
-            <a:endParaRPr lang="en-US" sz="1800" dirty="0"/>
-          </a:p>
-        </p:txBody>
-      </p:sp>
+            <a:ext cx="8229600" cy="3200400"/>
+          </a:xfrm>
+          <a:prstGeom prst="rect">
+            <a:avLst/>
+          </a:prstGeom>
+        </p:spPr>
+      </p:pic>
     </p:spTree>
   </p:cSld>
   <p:clrMapOvr>
@@ -2381,7 +2470,7 @@
                   <a:srgbClr val="DF6D6D"/>
                 </a:solidFill>
               </a:rPr>
-              <a:t>7. GitHub Usage</a:t>
+              <a:t>7. Key Feature Delivery</a:t>
             </a:r>
             <a:endParaRPr lang="en-US" sz="3200" dirty="0"/>
           </a:p>
@@ -2413,12 +2502,23 @@
               <a:buChar char="•"/>
             </a:pPr>
             <a:r>
+              <a:rPr lang="en-US" sz="1800" b="1" dirty="0">
+                <a:solidFill>
+                  <a:srgbClr val="FFFFFF"/>
+                </a:solidFill>
+              </a:rPr>
+              <a:t>Dark Mode (v1.1): </a:t>
+            </a:r>
+            <a:pPr indent="0" marL="0">
+              <a:buNone/>
+            </a:pPr>
+            <a:r>
               <a:rPr lang="en-US" sz="1800" dirty="0">
                 <a:solidFill>
-                  <a:srgbClr val="F9FAFB"/>
-                </a:solidFill>
-              </a:rPr>
-              <a:t>Remote Collaboration suitable for teams.</a:t>
+                  <a:srgbClr val="9CA3AF"/>
+                </a:solidFill>
+              </a:rPr>
+              <a:t>Config-based theming (Tailwind). Persisted via LocalStorage.</a:t>
             </a:r>
             <a:endParaRPr lang="en-US" sz="1800" dirty="0"/>
           </a:p>
@@ -2450,12 +2550,23 @@
               <a:buChar char="•"/>
             </a:pPr>
             <a:r>
+              <a:rPr lang="en-US" sz="1800" b="1" dirty="0">
+                <a:solidFill>
+                  <a:srgbClr val="FFFFFF"/>
+                </a:solidFill>
+              </a:rPr>
+              <a:t>Status Music: </a:t>
+            </a:r>
+            <a:pPr indent="0" marL="0">
+              <a:buNone/>
+            </a:pPr>
+            <a:r>
               <a:rPr lang="en-US" sz="1800" dirty="0">
                 <a:solidFill>
-                  <a:srgbClr val="F9FAFB"/>
-                </a:solidFill>
-              </a:rPr>
-              <a:t>Release Management with Git Tags.</a:t>
+                  <a:srgbClr val="9CA3AF"/>
+                </a:solidFill>
+              </a:rPr>
+              <a:t>Binary data handling. Decision: Client-side IndexedDB (Efficiency).</a:t>
             </a:r>
             <a:endParaRPr lang="en-US" sz="1800" dirty="0"/>
           </a:p>
@@ -2487,12 +2598,23 @@
               <a:buChar char="•"/>
             </a:pPr>
             <a:r>
+              <a:rPr lang="en-US" sz="1800" b="1" dirty="0">
+                <a:solidFill>
+                  <a:srgbClr val="FFFFFF"/>
+                </a:solidFill>
+              </a:rPr>
+              <a:t>v1.5 Releases: </a:t>
+            </a:r>
+            <a:pPr indent="0" marL="0">
+              <a:buNone/>
+            </a:pPr>
+            <a:r>
               <a:rPr lang="en-US" sz="1800" dirty="0">
                 <a:solidFill>
-                  <a:srgbClr val="F9FAFB"/>
-                </a:solidFill>
-              </a:rPr>
-              <a:t>Comprehensive Documentation (README w/ Badges).</a:t>
+                  <a:srgbClr val="9CA3AF"/>
+                </a:solidFill>
+              </a:rPr>
+              <a:t>Agile fixes: Logout Button, Secure Event Deletion.</a:t>
             </a:r>
             <a:endParaRPr lang="en-US" sz="1800" dirty="0"/>
           </a:p>
@@ -2560,7 +2682,186 @@
                   <a:srgbClr val="DF6D6D"/>
                 </a:solidFill>
               </a:rPr>
-              <a:t>8. Conclusion</a:t>
+              <a:t>8. GitHub Usage</a:t>
+            </a:r>
+            <a:endParaRPr lang="en-US" sz="3200" dirty="0"/>
+          </a:p>
+        </p:txBody>
+      </p:sp>
+      <p:sp>
+        <p:nvSpPr>
+          <p:cNvPr id="3" name="Text 1"/>
+          <p:cNvSpPr/>
+          <p:nvPr/>
+        </p:nvSpPr>
+        <p:spPr>
+          <a:xfrm>
+            <a:off x="457200" y="1371600"/>
+            <a:ext cx="8229600" cy="457200"/>
+          </a:xfrm>
+          <a:prstGeom prst="rect">
+            <a:avLst/>
+          </a:prstGeom>
+          <a:noFill/>
+          <a:ln/>
+        </p:spPr>
+        <p:txBody>
+          <a:bodyPr wrap="square" rtlCol="0" anchor="ctr"/>
+          <a:lstStyle/>
+          <a:p>
+            <a:pPr marL="342900" indent="-342900">
+              <a:buSzPct val="100000"/>
+              <a:buChar char="•"/>
+            </a:pPr>
+            <a:r>
+              <a:rPr lang="en-US" sz="1800" dirty="0">
+                <a:solidFill>
+                  <a:srgbClr val="F9FAFB"/>
+                </a:solidFill>
+              </a:rPr>
+              <a:t>Remote Collaboration suitable for teams.</a:t>
+            </a:r>
+            <a:endParaRPr lang="en-US" sz="1800" dirty="0"/>
+          </a:p>
+        </p:txBody>
+      </p:sp>
+      <p:sp>
+        <p:nvSpPr>
+          <p:cNvPr id="4" name="Text 2"/>
+          <p:cNvSpPr/>
+          <p:nvPr/>
+        </p:nvSpPr>
+        <p:spPr>
+          <a:xfrm>
+            <a:off x="457200" y="1920240"/>
+            <a:ext cx="8229600" cy="457200"/>
+          </a:xfrm>
+          <a:prstGeom prst="rect">
+            <a:avLst/>
+          </a:prstGeom>
+          <a:noFill/>
+          <a:ln/>
+        </p:spPr>
+        <p:txBody>
+          <a:bodyPr wrap="square" rtlCol="0" anchor="ctr"/>
+          <a:lstStyle/>
+          <a:p>
+            <a:pPr marL="342900" indent="-342900">
+              <a:buSzPct val="100000"/>
+              <a:buChar char="•"/>
+            </a:pPr>
+            <a:r>
+              <a:rPr lang="en-US" sz="1800" dirty="0">
+                <a:solidFill>
+                  <a:srgbClr val="F9FAFB"/>
+                </a:solidFill>
+              </a:rPr>
+              <a:t>Release Management with Git Tags.</a:t>
+            </a:r>
+            <a:endParaRPr lang="en-US" sz="1800" dirty="0"/>
+          </a:p>
+        </p:txBody>
+      </p:sp>
+      <p:sp>
+        <p:nvSpPr>
+          <p:cNvPr id="5" name="Text 3"/>
+          <p:cNvSpPr/>
+          <p:nvPr/>
+        </p:nvSpPr>
+        <p:spPr>
+          <a:xfrm>
+            <a:off x="457200" y="2468880"/>
+            <a:ext cx="8229600" cy="457200"/>
+          </a:xfrm>
+          <a:prstGeom prst="rect">
+            <a:avLst/>
+          </a:prstGeom>
+          <a:noFill/>
+          <a:ln/>
+        </p:spPr>
+        <p:txBody>
+          <a:bodyPr wrap="square" rtlCol="0" anchor="ctr"/>
+          <a:lstStyle/>
+          <a:p>
+            <a:pPr marL="342900" indent="-342900">
+              <a:buSzPct val="100000"/>
+              <a:buChar char="•"/>
+            </a:pPr>
+            <a:r>
+              <a:rPr lang="en-US" sz="1800" dirty="0">
+                <a:solidFill>
+                  <a:srgbClr val="F9FAFB"/>
+                </a:solidFill>
+              </a:rPr>
+              <a:t>Comprehensive Documentation (README w/ Badges).</a:t>
+            </a:r>
+            <a:endParaRPr lang="en-US" sz="1800" dirty="0"/>
+          </a:p>
+        </p:txBody>
+      </p:sp>
+    </p:spTree>
+  </p:cSld>
+  <p:clrMapOvr>
+    <a:masterClrMapping/>
+  </p:clrMapOvr>
+</p:sld>
+</file>
+
+<file path=ppt/slides/slide14.xml><?xml version="1.0" encoding="utf-8"?>
+<p:sld xmlns:a="http://schemas.openxmlformats.org/drawingml/2006/main" xmlns:r="http://schemas.openxmlformats.org/officeDocument/2006/relationships" xmlns:p="http://schemas.openxmlformats.org/presentationml/2006/main">
+  <p:cSld name="Slide 14">
+    <p:bg>
+      <p:bgPr>
+        <a:solidFill>
+          <a:srgbClr val="111827"/>
+        </a:solidFill>
+      </p:bgPr>
+    </p:bg>
+    <p:spTree>
+      <p:nvGrpSpPr>
+        <p:cNvPr id="1" name=""/>
+        <p:cNvGrpSpPr/>
+        <p:nvPr/>
+      </p:nvGrpSpPr>
+      <p:grpSpPr>
+        <a:xfrm>
+          <a:off x="0" y="0"/>
+          <a:ext cx="0" cy="0"/>
+          <a:chOff x="0" y="0"/>
+          <a:chExt cx="0" cy="0"/>
+        </a:xfrm>
+      </p:grpSpPr>
+      <p:sp>
+        <p:nvSpPr>
+          <p:cNvPr id="2" name="Text 0"/>
+          <p:cNvSpPr/>
+          <p:nvPr/>
+        </p:nvSpPr>
+        <p:spPr>
+          <a:xfrm>
+            <a:off x="457200" y="457200"/>
+            <a:ext cx="8229600" cy="731520"/>
+          </a:xfrm>
+          <a:prstGeom prst="rect">
+            <a:avLst/>
+          </a:prstGeom>
+          <a:noFill/>
+          <a:ln/>
+        </p:spPr>
+        <p:txBody>
+          <a:bodyPr wrap="square" rtlCol="0" anchor="ctr"/>
+          <a:lstStyle/>
+          <a:p>
+            <a:pPr indent="0" marL="0">
+              <a:buNone/>
+            </a:pPr>
+            <a:r>
+              <a:rPr lang="en-US" sz="3200" b="1" dirty="0">
+                <a:solidFill>
+                  <a:srgbClr val="DF6D6D"/>
+                </a:solidFill>
+              </a:rPr>
+              <a:t>9. Conclusion</a:t>
             </a:r>
             <a:endParaRPr lang="en-US" sz="3200" dirty="0"/>
           </a:p>
@@ -2951,7 +3252,7 @@
                   <a:srgbClr val="DF6D6D"/>
                 </a:solidFill>
               </a:rPr>
-              <a:t>2. Problem Identification</a:t>
+              <a:t>2. Table of Contents</a:t>
             </a:r>
             <a:endParaRPr lang="en-US" sz="3200" dirty="0"/>
           </a:p>
@@ -2983,23 +3284,12 @@
               <a:buChar char="•"/>
             </a:pPr>
             <a:r>
-              <a:rPr lang="en-US" sz="1800" b="1" dirty="0">
-                <a:solidFill>
-                  <a:srgbClr val="FFFFFF"/>
-                </a:solidFill>
-              </a:rPr>
-              <a:t>No Event Planning in WhatsApp: </a:t>
-            </a:r>
-            <a:pPr indent="0" marL="0">
-              <a:buNone/>
-            </a:pPr>
-            <a:r>
               <a:rPr lang="en-US" sz="1800" dirty="0">
                 <a:solidFill>
-                  <a:srgbClr val="9CA3AF"/>
-                </a:solidFill>
-              </a:rPr>
-              <a:t>Details lost in spam. Confusion on who/where.</a:t>
+                  <a:srgbClr val="F9FAFB"/>
+                </a:solidFill>
+              </a:rPr>
+              <a:t>1. Problem Identification</a:t>
             </a:r>
             <a:endParaRPr lang="en-US" sz="1800" dirty="0"/>
           </a:p>
@@ -3031,23 +3321,12 @@
               <a:buChar char="•"/>
             </a:pPr>
             <a:r>
-              <a:rPr lang="en-US" sz="1800" b="1" dirty="0">
-                <a:solidFill>
-                  <a:srgbClr val="FFFFFF"/>
-                </a:solidFill>
-              </a:rPr>
-              <a:t>Boring Status Updates: </a:t>
-            </a:r>
-            <a:pPr indent="0" marL="0">
-              <a:buNone/>
-            </a:pPr>
-            <a:r>
               <a:rPr lang="en-US" sz="1800" dirty="0">
                 <a:solidFill>
-                  <a:srgbClr val="9CA3AF"/>
-                </a:solidFill>
-              </a:rPr>
-              <a:t>Static text/images lack 'vibe'. No local music support.</a:t>
+                  <a:srgbClr val="F9FAFB"/>
+                </a:solidFill>
+              </a:rPr>
+              <a:t>2. The Solution: CircleUp</a:t>
             </a:r>
             <a:endParaRPr lang="en-US" sz="1800" dirty="0"/>
           </a:p>
@@ -3079,23 +3358,12 @@
               <a:buChar char="•"/>
             </a:pPr>
             <a:r>
-              <a:rPr lang="en-US" sz="1800" b="1" dirty="0">
-                <a:solidFill>
-                  <a:srgbClr val="FFFFFF"/>
-                </a:solidFill>
-              </a:rPr>
-              <a:t>Fragmented Tools: </a:t>
-            </a:r>
-            <a:pPr indent="0" marL="0">
-              <a:buNone/>
-            </a:pPr>
-            <a:r>
               <a:rPr lang="en-US" sz="1800" dirty="0">
                 <a:solidFill>
-                  <a:srgbClr val="9CA3AF"/>
-                </a:solidFill>
-              </a:rPr>
-              <a:t>Switching apps (Insta, G-Forms, WhatsApp) to manage one event.</a:t>
+                  <a:srgbClr val="F9FAFB"/>
+                </a:solidFill>
+              </a:rPr>
+              <a:t>3. Technical Architecture</a:t>
             </a:r>
             <a:endParaRPr lang="en-US" sz="1800" dirty="0"/>
           </a:p>
@@ -3127,23 +3395,12 @@
               <a:buChar char="•"/>
             </a:pPr>
             <a:r>
-              <a:rPr lang="en-US" sz="1800" b="1" dirty="0">
-                <a:solidFill>
-                  <a:srgbClr val="FFFFFF"/>
-                </a:solidFill>
-              </a:rPr>
-              <a:t>Social Disconnect (FB Events): </a:t>
-            </a:r>
-            <a:pPr indent="0" marL="0">
-              <a:buNone/>
-            </a:pPr>
-            <a:r>
               <a:rPr lang="en-US" sz="1800" dirty="0">
                 <a:solidFill>
-                  <a:srgbClr val="9CA3AF"/>
-                </a:solidFill>
-              </a:rPr>
-              <a:t>Good features, but empty 'ghost town' engagement.</a:t>
+                  <a:srgbClr val="F9FAFB"/>
+                </a:solidFill>
+              </a:rPr>
+              <a:t>4. Version Control Strategy</a:t>
             </a:r>
             <a:endParaRPr lang="en-US" sz="1800" dirty="0"/>
           </a:p>
@@ -3175,23 +3432,12 @@
               <a:buChar char="•"/>
             </a:pPr>
             <a:r>
-              <a:rPr lang="en-US" sz="1800" b="1" dirty="0">
-                <a:solidFill>
-                  <a:srgbClr val="FFFFFF"/>
-                </a:solidFill>
-              </a:rPr>
-              <a:t>Complexity (Discord): </a:t>
-            </a:r>
-            <a:pPr indent="0" marL="0">
-              <a:buNone/>
-            </a:pPr>
-            <a:r>
               <a:rPr lang="en-US" sz="1800" dirty="0">
                 <a:solidFill>
-                  <a:srgbClr val="9CA3AF"/>
-                </a:solidFill>
-              </a:rPr>
-              <a:t>Powerful but overwhelming for non-tech users.</a:t>
+                  <a:srgbClr val="F9FAFB"/>
+                </a:solidFill>
+              </a:rPr>
+              <a:t>5. Key Feature Delivery</a:t>
             </a:r>
             <a:endParaRPr lang="en-US" sz="1800" dirty="0"/>
           </a:p>
@@ -3223,23 +3469,49 @@
               <a:buChar char="•"/>
             </a:pPr>
             <a:r>
-              <a:rPr lang="en-US" sz="1800" b="1" dirty="0">
-                <a:solidFill>
-                  <a:srgbClr val="FFFFFF"/>
-                </a:solidFill>
-              </a:rPr>
-              <a:t>Lack of Admin Control: </a:t>
-            </a:r>
-            <a:pPr indent="0" marL="0">
-              <a:buNone/>
-            </a:pPr>
-            <a:r>
               <a:rPr lang="en-US" sz="1800" dirty="0">
                 <a:solidFill>
-                  <a:srgbClr val="9CA3AF"/>
-                </a:solidFill>
-              </a:rPr>
-              <a:t>Group chats lack owner-managed threads.</a:t>
+                  <a:srgbClr val="F9FAFB"/>
+                </a:solidFill>
+              </a:rPr>
+              <a:t>6. GitHub Usage</a:t>
+            </a:r>
+            <a:endParaRPr lang="en-US" sz="1800" dirty="0"/>
+          </a:p>
+        </p:txBody>
+      </p:sp>
+      <p:sp>
+        <p:nvSpPr>
+          <p:cNvPr id="9" name="Text 7"/>
+          <p:cNvSpPr/>
+          <p:nvPr/>
+        </p:nvSpPr>
+        <p:spPr>
+          <a:xfrm>
+            <a:off x="457200" y="4663440"/>
+            <a:ext cx="8229600" cy="457200"/>
+          </a:xfrm>
+          <a:prstGeom prst="rect">
+            <a:avLst/>
+          </a:prstGeom>
+          <a:noFill/>
+          <a:ln/>
+        </p:spPr>
+        <p:txBody>
+          <a:bodyPr wrap="square" rtlCol="0" anchor="ctr"/>
+          <a:lstStyle/>
+          <a:p>
+            <a:pPr marL="342900" indent="-342900">
+              <a:buSzPct val="100000"/>
+              <a:buChar char="•"/>
+            </a:pPr>
+            <a:r>
+              <a:rPr lang="en-US" sz="1800" dirty="0">
+                <a:solidFill>
+                  <a:srgbClr val="F9FAFB"/>
+                </a:solidFill>
+              </a:rPr>
+              <a:t>7. Conclusion</a:t>
             </a:r>
             <a:endParaRPr lang="en-US" sz="1800" dirty="0"/>
           </a:p>
@@ -3307,7 +3579,7 @@
                   <a:srgbClr val="DF6D6D"/>
                 </a:solidFill>
               </a:rPr>
-              <a:t>3. The Solution: CircleUp</a:t>
+              <a:t>3. Problem Identification</a:t>
             </a:r>
             <a:endParaRPr lang="en-US" sz="3200" dirty="0"/>
           </a:p>
@@ -3344,7 +3616,7 @@
                   <a:srgbClr val="FFFFFF"/>
                 </a:solidFill>
               </a:rPr>
-              <a:t>All-in-One: </a:t>
+              <a:t>No Event Planning in WhatsApp: </a:t>
             </a:r>
             <a:pPr indent="0" marL="0">
               <a:buNone/>
@@ -3355,7 +3627,7 @@
                   <a:srgbClr val="9CA3AF"/>
                 </a:solidFill>
               </a:rPr>
-              <a:t>Unified Chat + Event Management.</a:t>
+              <a:t>Details lost in spam. Confusion on who/where.</a:t>
             </a:r>
             <a:endParaRPr lang="en-US" sz="1800" dirty="0"/>
           </a:p>
@@ -3392,7 +3664,7 @@
                   <a:srgbClr val="FFFFFF"/>
                 </a:solidFill>
               </a:rPr>
-              <a:t>Status Music: </a:t>
+              <a:t>Boring Status Updates: </a:t>
             </a:r>
             <a:pPr indent="0" marL="0">
               <a:buNone/>
@@ -3403,7 +3675,7 @@
                   <a:srgbClr val="9CA3AF"/>
                 </a:solidFill>
               </a:rPr>
-              <a:t>Expressive local audio statuses (Green DevOps: no server bloat).</a:t>
+              <a:t>Static text/images lack 'vibe'. No local music support.</a:t>
             </a:r>
             <a:endParaRPr lang="en-US" sz="1800" dirty="0"/>
           </a:p>
@@ -3440,7 +3712,7 @@
                   <a:srgbClr val="FFFFFF"/>
                 </a:solidFill>
               </a:rPr>
-              <a:t>User-Centric: </a:t>
+              <a:t>Fragmented Tools: </a:t>
             </a:r>
             <a:pPr indent="0" marL="0">
               <a:buNone/>
@@ -3451,7 +3723,7 @@
                   <a:srgbClr val="9CA3AF"/>
                 </a:solidFill>
               </a:rPr>
-              <a:t>Dark Mode, Responsive, Simple UI.</a:t>
+              <a:t>Switching apps (Insta, G-Forms, WhatsApp) to manage one event.</a:t>
             </a:r>
             <a:endParaRPr lang="en-US" sz="1800" dirty="0"/>
           </a:p>
@@ -3488,7 +3760,7 @@
                   <a:srgbClr val="FFFFFF"/>
                 </a:solidFill>
               </a:rPr>
-              <a:t>Secure: </a:t>
+              <a:t>Social Disconnect (FB Events): </a:t>
             </a:r>
             <a:pPr indent="0" marL="0">
               <a:buNone/>
@@ -3499,7 +3771,103 @@
                   <a:srgbClr val="9CA3AF"/>
                 </a:solidFill>
               </a:rPr>
-              <a:t>JWT Auth, Owner-only Event Deletion.</a:t>
+              <a:t>Good features, but empty 'ghost town' engagement.</a:t>
+            </a:r>
+            <a:endParaRPr lang="en-US" sz="1800" dirty="0"/>
+          </a:p>
+        </p:txBody>
+      </p:sp>
+      <p:sp>
+        <p:nvSpPr>
+          <p:cNvPr id="7" name="Text 5"/>
+          <p:cNvSpPr/>
+          <p:nvPr/>
+        </p:nvSpPr>
+        <p:spPr>
+          <a:xfrm>
+            <a:off x="457200" y="3566160"/>
+            <a:ext cx="8229600" cy="457200"/>
+          </a:xfrm>
+          <a:prstGeom prst="rect">
+            <a:avLst/>
+          </a:prstGeom>
+          <a:noFill/>
+          <a:ln/>
+        </p:spPr>
+        <p:txBody>
+          <a:bodyPr wrap="square" rtlCol="0" anchor="ctr"/>
+          <a:lstStyle/>
+          <a:p>
+            <a:pPr marL="342900" indent="-342900">
+              <a:buSzPct val="100000"/>
+              <a:buChar char="•"/>
+            </a:pPr>
+            <a:r>
+              <a:rPr lang="en-US" sz="1800" b="1" dirty="0">
+                <a:solidFill>
+                  <a:srgbClr val="FFFFFF"/>
+                </a:solidFill>
+              </a:rPr>
+              <a:t>Complexity (Discord): </a:t>
+            </a:r>
+            <a:pPr indent="0" marL="0">
+              <a:buNone/>
+            </a:pPr>
+            <a:r>
+              <a:rPr lang="en-US" sz="1800" dirty="0">
+                <a:solidFill>
+                  <a:srgbClr val="9CA3AF"/>
+                </a:solidFill>
+              </a:rPr>
+              <a:t>Powerful but overwhelming for non-tech users.</a:t>
+            </a:r>
+            <a:endParaRPr lang="en-US" sz="1800" dirty="0"/>
+          </a:p>
+        </p:txBody>
+      </p:sp>
+      <p:sp>
+        <p:nvSpPr>
+          <p:cNvPr id="8" name="Text 6"/>
+          <p:cNvSpPr/>
+          <p:nvPr/>
+        </p:nvSpPr>
+        <p:spPr>
+          <a:xfrm>
+            <a:off x="457200" y="4114800"/>
+            <a:ext cx="8229600" cy="457200"/>
+          </a:xfrm>
+          <a:prstGeom prst="rect">
+            <a:avLst/>
+          </a:prstGeom>
+          <a:noFill/>
+          <a:ln/>
+        </p:spPr>
+        <p:txBody>
+          <a:bodyPr wrap="square" rtlCol="0" anchor="ctr"/>
+          <a:lstStyle/>
+          <a:p>
+            <a:pPr marL="342900" indent="-342900">
+              <a:buSzPct val="100000"/>
+              <a:buChar char="•"/>
+            </a:pPr>
+            <a:r>
+              <a:rPr lang="en-US" sz="1800" b="1" dirty="0">
+                <a:solidFill>
+                  <a:srgbClr val="FFFFFF"/>
+                </a:solidFill>
+              </a:rPr>
+              <a:t>Lack of Admin Control: </a:t>
+            </a:r>
+            <a:pPr indent="0" marL="0">
+              <a:buNone/>
+            </a:pPr>
+            <a:r>
+              <a:rPr lang="en-US" sz="1800" dirty="0">
+                <a:solidFill>
+                  <a:srgbClr val="9CA3AF"/>
+                </a:solidFill>
+              </a:rPr>
+              <a:t>Group chats lack owner-managed threads.</a:t>
             </a:r>
             <a:endParaRPr lang="en-US" sz="1800" dirty="0"/>
           </a:p>
@@ -3567,7 +3935,7 @@
                   <a:srgbClr val="DF6D6D"/>
                 </a:solidFill>
               </a:rPr>
-              <a:t>4. Technical Architecture (Brief)</a:t>
+              <a:t>4. The Solution: CircleUp</a:t>
             </a:r>
             <a:endParaRPr lang="en-US" sz="3200" dirty="0"/>
           </a:p>
@@ -3604,7 +3972,7 @@
                   <a:srgbClr val="FFFFFF"/>
                 </a:solidFill>
               </a:rPr>
-              <a:t>Frontend: </a:t>
+              <a:t>All-in-One: </a:t>
             </a:r>
             <a:pPr indent="0" marL="0">
               <a:buNone/>
@@ -3615,7 +3983,7 @@
                   <a:srgbClr val="9CA3AF"/>
                 </a:solidFill>
               </a:rPr>
-              <a:t>React + Vite, TailwindCSS (for Dark Mode), Zustand.</a:t>
+              <a:t>Unified Chat + Event Management.</a:t>
             </a:r>
             <a:endParaRPr lang="en-US" sz="1800" dirty="0"/>
           </a:p>
@@ -3652,7 +4020,7 @@
                   <a:srgbClr val="FFFFFF"/>
                 </a:solidFill>
               </a:rPr>
-              <a:t>Backend: </a:t>
+              <a:t>Status Music: </a:t>
             </a:r>
             <a:pPr indent="0" marL="0">
               <a:buNone/>
@@ -3663,7 +4031,7 @@
                   <a:srgbClr val="9CA3AF"/>
                 </a:solidFill>
               </a:rPr>
-              <a:t>Node/Express, MongoDB (Flexible schema).</a:t>
+              <a:t>Expressive local audio statuses (Green DevOps: no server bloat).</a:t>
             </a:r>
             <a:endParaRPr lang="en-US" sz="1800" dirty="0"/>
           </a:p>
@@ -3700,7 +4068,7 @@
                   <a:srgbClr val="FFFFFF"/>
                 </a:solidFill>
               </a:rPr>
-              <a:t>Real-time: </a:t>
+              <a:t>User-Centric: </a:t>
             </a:r>
             <a:pPr indent="0" marL="0">
               <a:buNone/>
@@ -3711,7 +4079,55 @@
                   <a:srgbClr val="9CA3AF"/>
                 </a:solidFill>
               </a:rPr>
-              <a:t>Socket.IO for instant msg &amp; status updates.</a:t>
+              <a:t>Dark Mode, Responsive, Simple UI.</a:t>
+            </a:r>
+            <a:endParaRPr lang="en-US" sz="1800" dirty="0"/>
+          </a:p>
+        </p:txBody>
+      </p:sp>
+      <p:sp>
+        <p:nvSpPr>
+          <p:cNvPr id="6" name="Text 4"/>
+          <p:cNvSpPr/>
+          <p:nvPr/>
+        </p:nvSpPr>
+        <p:spPr>
+          <a:xfrm>
+            <a:off x="457200" y="3017520"/>
+            <a:ext cx="8229600" cy="457200"/>
+          </a:xfrm>
+          <a:prstGeom prst="rect">
+            <a:avLst/>
+          </a:prstGeom>
+          <a:noFill/>
+          <a:ln/>
+        </p:spPr>
+        <p:txBody>
+          <a:bodyPr wrap="square" rtlCol="0" anchor="ctr"/>
+          <a:lstStyle/>
+          <a:p>
+            <a:pPr marL="342900" indent="-342900">
+              <a:buSzPct val="100000"/>
+              <a:buChar char="•"/>
+            </a:pPr>
+            <a:r>
+              <a:rPr lang="en-US" sz="1800" b="1" dirty="0">
+                <a:solidFill>
+                  <a:srgbClr val="FFFFFF"/>
+                </a:solidFill>
+              </a:rPr>
+              <a:t>Secure: </a:t>
+            </a:r>
+            <a:pPr indent="0" marL="0">
+              <a:buNone/>
+            </a:pPr>
+            <a:r>
+              <a:rPr lang="en-US" sz="1800" dirty="0">
+                <a:solidFill>
+                  <a:srgbClr val="9CA3AF"/>
+                </a:solidFill>
+              </a:rPr>
+              <a:t>JWT Auth, Owner-only Event Deletion.</a:t>
             </a:r>
             <a:endParaRPr lang="en-US" sz="1800" dirty="0"/>
           </a:p>
@@ -3779,7 +4195,7 @@
                   <a:srgbClr val="DF6D6D"/>
                 </a:solidFill>
               </a:rPr>
-              <a:t>5.1 Version Control: Why Git?</a:t>
+              <a:t>5. Technical Architecture (Brief)</a:t>
             </a:r>
             <a:endParaRPr lang="en-US" sz="3200" dirty="0"/>
           </a:p>
@@ -3816,7 +4232,7 @@
                   <a:srgbClr val="FFFFFF"/>
                 </a:solidFill>
               </a:rPr>
-              <a:t>Safety Net: </a:t>
+              <a:t>Frontend: </a:t>
             </a:r>
             <a:pPr indent="0" marL="0">
               <a:buNone/>
@@ -3827,7 +4243,7 @@
                   <a:srgbClr val="9CA3AF"/>
                 </a:solidFill>
               </a:rPr>
-              <a:t>Every change is tracked. 'git reflog' saves us from mistakes.</a:t>
+              <a:t>React + Vite, TailwindCSS (for Dark Mode), Zustand.</a:t>
             </a:r>
             <a:endParaRPr lang="en-US" sz="1800" dirty="0"/>
           </a:p>
@@ -3864,7 +4280,7 @@
                   <a:srgbClr val="FFFFFF"/>
                 </a:solidFill>
               </a:rPr>
-              <a:t>Collaboration: </a:t>
+              <a:t>Backend: </a:t>
             </a:r>
             <a:pPr indent="0" marL="0">
               <a:buNone/>
@@ -3875,7 +4291,7 @@
                   <a:srgbClr val="9CA3AF"/>
                 </a:solidFill>
               </a:rPr>
-              <a:t>Enables multiple developers (or feature branches) to work in parallel.</a:t>
+              <a:t>Node/Express, MongoDB (Flexible schema).</a:t>
             </a:r>
             <a:endParaRPr lang="en-US" sz="1800" dirty="0"/>
           </a:p>
@@ -3912,7 +4328,7 @@
                   <a:srgbClr val="FFFFFF"/>
                 </a:solidFill>
               </a:rPr>
-              <a:t>Code Integrity: </a:t>
+              <a:t>Real-time: </a:t>
             </a:r>
             <a:pPr indent="0" marL="0">
               <a:buNone/>
@@ -3923,7 +4339,7 @@
                   <a:srgbClr val="9CA3AF"/>
                 </a:solidFill>
               </a:rPr>
-              <a:t>Ensures production code (`main`) remains stable while features are tested elsewhere.</a:t>
+              <a:t>Socket.IO for instant msg &amp; status updates.</a:t>
             </a:r>
             <a:endParaRPr lang="en-US" sz="1800" dirty="0"/>
           </a:p>
@@ -3991,7 +4407,7 @@
                   <a:srgbClr val="DF6D6D"/>
                 </a:solidFill>
               </a:rPr>
-              <a:t>5.2 Branching Strategy</a:t>
+              <a:t>6.1 Version Control: Why Git?</a:t>
             </a:r>
             <a:endParaRPr lang="en-US" sz="3200" dirty="0"/>
           </a:p>
@@ -4028,7 +4444,7 @@
                   <a:srgbClr val="FFFFFF"/>
                 </a:solidFill>
               </a:rPr>
-              <a:t>main: </a:t>
+              <a:t>Safety Net: </a:t>
             </a:r>
             <a:pPr indent="0" marL="0">
               <a:buNone/>
@@ -4039,7 +4455,7 @@
                   <a:srgbClr val="9CA3AF"/>
                 </a:solidFill>
               </a:rPr>
-              <a:t>The 'Golden Copy'. Only stable, tested code lands here.</a:t>
+              <a:t>Every change is tracked. 'git reflog' saves us from mistakes.</a:t>
             </a:r>
             <a:endParaRPr lang="en-US" sz="1800" dirty="0"/>
           </a:p>
@@ -4076,7 +4492,7 @@
                   <a:srgbClr val="FFFFFF"/>
                 </a:solidFill>
               </a:rPr>
-              <a:t>v1.1 (Dark Mode): </a:t>
+              <a:t>Collaboration: </a:t>
             </a:r>
             <a:pPr indent="0" marL="0">
               <a:buNone/>
@@ -4087,7 +4503,7 @@
                   <a:srgbClr val="9CA3AF"/>
                 </a:solidFill>
               </a:rPr>
-              <a:t>Isolated logic for theming. Prevents CSS bugs from affecting main app.</a:t>
+              <a:t>Enables multiple developers (or feature branches) to work in parallel.</a:t>
             </a:r>
             <a:endParaRPr lang="en-US" sz="1800" dirty="0"/>
           </a:p>
@@ -4124,7 +4540,7 @@
                   <a:srgbClr val="FFFFFF"/>
                 </a:solidFill>
               </a:rPr>
-              <a:t>v1.2 (Status Music): </a:t>
+              <a:t>Code Integrity: </a:t>
             </a:r>
             <a:pPr indent="0" marL="0">
               <a:buNone/>
@@ -4135,55 +4551,7 @@
                   <a:srgbClr val="9CA3AF"/>
                 </a:solidFill>
               </a:rPr>
-              <a:t>Experimental features (IndexedDB) kept separate until proven stable.</a:t>
-            </a:r>
-            <a:endParaRPr lang="en-US" sz="1800" dirty="0"/>
-          </a:p>
-        </p:txBody>
-      </p:sp>
-      <p:sp>
-        <p:nvSpPr>
-          <p:cNvPr id="6" name="Text 4"/>
-          <p:cNvSpPr/>
-          <p:nvPr/>
-        </p:nvSpPr>
-        <p:spPr>
-          <a:xfrm>
-            <a:off x="457200" y="3017520"/>
-            <a:ext cx="8229600" cy="457200"/>
-          </a:xfrm>
-          <a:prstGeom prst="rect">
-            <a:avLst/>
-          </a:prstGeom>
-          <a:noFill/>
-          <a:ln/>
-        </p:spPr>
-        <p:txBody>
-          <a:bodyPr wrap="square" rtlCol="0" anchor="ctr"/>
-          <a:lstStyle/>
-          <a:p>
-            <a:pPr marL="342900" indent="-342900">
-              <a:buSzPct val="100000"/>
-              <a:buChar char="•"/>
-            </a:pPr>
-            <a:r>
-              <a:rPr lang="en-US" sz="1800" b="1" dirty="0">
-                <a:solidFill>
-                  <a:srgbClr val="FFFFFF"/>
-                </a:solidFill>
-              </a:rPr>
-              <a:t>v1.5 (Polishing): </a:t>
-            </a:r>
-            <a:pPr indent="0" marL="0">
-              <a:buNone/>
-            </a:pPr>
-            <a:r>
-              <a:rPr lang="en-US" sz="1800" dirty="0">
-                <a:solidFill>
-                  <a:srgbClr val="9CA3AF"/>
-                </a:solidFill>
-              </a:rPr>
-              <a:t>Release prep, bug fixes, and final touches.</a:t>
+              <a:t>Ensures production code (`main`) remains stable while features are tested elsewhere.</a:t>
             </a:r>
             <a:endParaRPr lang="en-US" sz="1800" dirty="0"/>
           </a:p>
@@ -4251,7 +4619,7 @@
                   <a:srgbClr val="DF6D6D"/>
                 </a:solidFill>
               </a:rPr>
-              <a:t>5.3 DevOps Logic: Rebase over Merge</a:t>
+              <a:t>6.2 Branching Strategy</a:t>
             </a:r>
             <a:endParaRPr lang="en-US" sz="3200" dirty="0"/>
           </a:p>
@@ -4288,7 +4656,7 @@
                   <a:srgbClr val="FFFFFF"/>
                 </a:solidFill>
               </a:rPr>
-              <a:t>The Problem: </a:t>
+              <a:t>main: </a:t>
             </a:r>
             <a:pPr indent="0" marL="0">
               <a:buNone/>
@@ -4299,7 +4667,7 @@
                   <a:srgbClr val="9CA3AF"/>
                 </a:solidFill>
               </a:rPr>
-              <a:t>Standard merges create 'commit bubbles' and messy history.</a:t>
+              <a:t>The 'Golden Copy'. Only stable, tested code lands here.</a:t>
             </a:r>
             <a:endParaRPr lang="en-US" sz="1800" dirty="0"/>
           </a:p>
@@ -4336,7 +4704,7 @@
                   <a:srgbClr val="FFFFFF"/>
                 </a:solidFill>
               </a:rPr>
-              <a:t>The Solution: </a:t>
+              <a:t>v1.1 (Dark Mode): </a:t>
             </a:r>
             <a:pPr indent="0" marL="0">
               <a:buNone/>
@@ -4347,7 +4715,7 @@
                   <a:srgbClr val="9CA3AF"/>
                 </a:solidFill>
               </a:rPr>
-              <a:t>`git rebase main` moves feature commits on TOP of the latest main.</a:t>
+              <a:t>Isolated logic for theming. Prevents CSS bugs from affecting main app.</a:t>
             </a:r>
             <a:endParaRPr lang="en-US" sz="1800" dirty="0"/>
           </a:p>
@@ -4384,7 +4752,7 @@
                   <a:srgbClr val="FFFFFF"/>
                 </a:solidFill>
               </a:rPr>
-              <a:t>Benefit: </a:t>
+              <a:t>v1.2 (Status Music): </a:t>
             </a:r>
             <a:pPr indent="0" marL="0">
               <a:buNone/>
@@ -4395,7 +4763,55 @@
                   <a:srgbClr val="9CA3AF"/>
                 </a:solidFill>
               </a:rPr>
-              <a:t>Linear History. Makes tracking bugs (`git bisect`) and code reviews much easier.</a:t>
+              <a:t>Experimental features (IndexedDB) kept separate until proven stable.</a:t>
+            </a:r>
+            <a:endParaRPr lang="en-US" sz="1800" dirty="0"/>
+          </a:p>
+        </p:txBody>
+      </p:sp>
+      <p:sp>
+        <p:nvSpPr>
+          <p:cNvPr id="6" name="Text 4"/>
+          <p:cNvSpPr/>
+          <p:nvPr/>
+        </p:nvSpPr>
+        <p:spPr>
+          <a:xfrm>
+            <a:off x="457200" y="3017520"/>
+            <a:ext cx="8229600" cy="457200"/>
+          </a:xfrm>
+          <a:prstGeom prst="rect">
+            <a:avLst/>
+          </a:prstGeom>
+          <a:noFill/>
+          <a:ln/>
+        </p:spPr>
+        <p:txBody>
+          <a:bodyPr wrap="square" rtlCol="0" anchor="ctr"/>
+          <a:lstStyle/>
+          <a:p>
+            <a:pPr marL="342900" indent="-342900">
+              <a:buSzPct val="100000"/>
+              <a:buChar char="•"/>
+            </a:pPr>
+            <a:r>
+              <a:rPr lang="en-US" sz="1800" b="1" dirty="0">
+                <a:solidFill>
+                  <a:srgbClr val="FFFFFF"/>
+                </a:solidFill>
+              </a:rPr>
+              <a:t>v1.5 (Polishing): </a:t>
+            </a:r>
+            <a:pPr indent="0" marL="0">
+              <a:buNone/>
+            </a:pPr>
+            <a:r>
+              <a:rPr lang="en-US" sz="1800" dirty="0">
+                <a:solidFill>
+                  <a:srgbClr val="9CA3AF"/>
+                </a:solidFill>
+              </a:rPr>
+              <a:t>Release prep, bug fixes, and final touches.</a:t>
             </a:r>
             <a:endParaRPr lang="en-US" sz="1800" dirty="0"/>
           </a:p>
@@ -4463,7 +4879,7 @@
                   <a:srgbClr val="DF6D6D"/>
                 </a:solidFill>
               </a:rPr>
-              <a:t>5.4 GitHub Power Tools</a:t>
+              <a:t>6.3 DevOps Logic: Rebase over Merge</a:t>
             </a:r>
             <a:endParaRPr lang="en-US" sz="3200" dirty="0"/>
           </a:p>
@@ -4500,7 +4916,7 @@
                   <a:srgbClr val="FFFFFF"/>
                 </a:solidFill>
               </a:rPr>
-              <a:t>Semantic Commits: </a:t>
+              <a:t>The Problem: </a:t>
             </a:r>
             <a:pPr indent="0" marL="0">
               <a:buNone/>
@@ -4511,7 +4927,7 @@
                   <a:srgbClr val="9CA3AF"/>
                 </a:solidFill>
               </a:rPr>
-              <a:t>Using `feat:`, `fix:`, `docs:` prefixes for clarity.</a:t>
+              <a:t>Standard merges create 'commit bubbles' and messy history.</a:t>
             </a:r>
             <a:endParaRPr lang="en-US" sz="1800" dirty="0"/>
           </a:p>
@@ -4548,7 +4964,7 @@
                   <a:srgbClr val="FFFFFF"/>
                 </a:solidFill>
               </a:rPr>
-              <a:t>Release Tags: </a:t>
+              <a:t>The Solution: </a:t>
             </a:r>
             <a:pPr indent="0" marL="0">
               <a:buNone/>
@@ -4559,7 +4975,7 @@
                   <a:srgbClr val="9CA3AF"/>
                 </a:solidFill>
               </a:rPr>
-              <a:t>Using `git tag v1.5` to mark specific deployment points.</a:t>
+              <a:t>`git rebase main` moves feature commits on TOP of the latest main.</a:t>
             </a:r>
             <a:endParaRPr lang="en-US" sz="1800" dirty="0"/>
           </a:p>
@@ -4596,7 +5012,7 @@
                   <a:srgbClr val="FFFFFF"/>
                 </a:solidFill>
               </a:rPr>
-              <a:t>Remote Backup: </a:t>
+              <a:t>Benefit: </a:t>
             </a:r>
             <a:pPr indent="0" marL="0">
               <a:buNone/>
@@ -4607,7 +5023,7 @@
                   <a:srgbClr val="9CA3AF"/>
                 </a:solidFill>
               </a:rPr>
-              <a:t>Decentralized code storage ensures no data loss.</a:t>
+              <a:t>Linear History. Makes tracking bugs (`git bisect`) and code reviews much easier.</a:t>
             </a:r>
             <a:endParaRPr lang="en-US" sz="1800" dirty="0"/>
           </a:p>

</xml_diff>